<commit_message>
Update IDX Financial Analysis
</commit_message>
<xml_diff>
--- a/IDX Financial Analysis/coret2.pptx
+++ b/IDX Financial Analysis/coret2.pptx
@@ -5,10 +5,15 @@
     <p:sldMasterId id="2147483648" r:id="rId1"/>
   </p:sldMasterIdLst>
   <p:sldIdLst>
-    <p:sldId id="260" r:id="rId2"/>
-    <p:sldId id="257" r:id="rId3"/>
-    <p:sldId id="258" r:id="rId4"/>
+    <p:sldId id="261" r:id="rId2"/>
+    <p:sldId id="262" r:id="rId3"/>
+    <p:sldId id="260" r:id="rId4"/>
     <p:sldId id="259" r:id="rId5"/>
+    <p:sldId id="263" r:id="rId6"/>
+    <p:sldId id="264" r:id="rId7"/>
+    <p:sldId id="265" r:id="rId8"/>
+    <p:sldId id="266" r:id="rId9"/>
+    <p:sldId id="267" r:id="rId10"/>
   </p:sldIdLst>
   <p:sldSz cx="12192000" cy="6858000"/>
   <p:notesSz cx="6858000" cy="9144000"/>
@@ -107,6 +112,11 @@
       </a:defRPr>
     </a:lvl9pPr>
   </p:defaultTextStyle>
+  <p:extLst>
+    <p:ext uri="{EFAFB233-063F-42B5-8137-9DF3F51BA10A}">
+      <p15:sldGuideLst xmlns:p15="http://schemas.microsoft.com/office/powerpoint/2012/main"/>
+    </p:ext>
+  </p:extLst>
 </p:presentation>
 </file>
 
@@ -259,7 +269,7 @@
           <a:p>
             <a:fld id="{5F6EB6D4-30B6-4E78-BDD6-1950D418B165}" type="datetimeFigureOut">
               <a:rPr lang="en-ID" smtClean="0"/>
-              <a:t>27/05/2024</a:t>
+              <a:t>28/05/2024</a:t>
             </a:fld>
             <a:endParaRPr lang="en-ID"/>
           </a:p>
@@ -459,7 +469,7 @@
           <a:p>
             <a:fld id="{5F6EB6D4-30B6-4E78-BDD6-1950D418B165}" type="datetimeFigureOut">
               <a:rPr lang="en-ID" smtClean="0"/>
-              <a:t>27/05/2024</a:t>
+              <a:t>28/05/2024</a:t>
             </a:fld>
             <a:endParaRPr lang="en-ID"/>
           </a:p>
@@ -669,7 +679,7 @@
           <a:p>
             <a:fld id="{5F6EB6D4-30B6-4E78-BDD6-1950D418B165}" type="datetimeFigureOut">
               <a:rPr lang="en-ID" smtClean="0"/>
-              <a:t>27/05/2024</a:t>
+              <a:t>28/05/2024</a:t>
             </a:fld>
             <a:endParaRPr lang="en-ID"/>
           </a:p>
@@ -869,7 +879,7 @@
           <a:p>
             <a:fld id="{5F6EB6D4-30B6-4E78-BDD6-1950D418B165}" type="datetimeFigureOut">
               <a:rPr lang="en-ID" smtClean="0"/>
-              <a:t>27/05/2024</a:t>
+              <a:t>28/05/2024</a:t>
             </a:fld>
             <a:endParaRPr lang="en-ID"/>
           </a:p>
@@ -1145,7 +1155,7 @@
           <a:p>
             <a:fld id="{5F6EB6D4-30B6-4E78-BDD6-1950D418B165}" type="datetimeFigureOut">
               <a:rPr lang="en-ID" smtClean="0"/>
-              <a:t>27/05/2024</a:t>
+              <a:t>28/05/2024</a:t>
             </a:fld>
             <a:endParaRPr lang="en-ID"/>
           </a:p>
@@ -1413,7 +1423,7 @@
           <a:p>
             <a:fld id="{5F6EB6D4-30B6-4E78-BDD6-1950D418B165}" type="datetimeFigureOut">
               <a:rPr lang="en-ID" smtClean="0"/>
-              <a:t>27/05/2024</a:t>
+              <a:t>28/05/2024</a:t>
             </a:fld>
             <a:endParaRPr lang="en-ID"/>
           </a:p>
@@ -1828,7 +1838,7 @@
           <a:p>
             <a:fld id="{5F6EB6D4-30B6-4E78-BDD6-1950D418B165}" type="datetimeFigureOut">
               <a:rPr lang="en-ID" smtClean="0"/>
-              <a:t>27/05/2024</a:t>
+              <a:t>28/05/2024</a:t>
             </a:fld>
             <a:endParaRPr lang="en-ID"/>
           </a:p>
@@ -1970,7 +1980,7 @@
           <a:p>
             <a:fld id="{5F6EB6D4-30B6-4E78-BDD6-1950D418B165}" type="datetimeFigureOut">
               <a:rPr lang="en-ID" smtClean="0"/>
-              <a:t>27/05/2024</a:t>
+              <a:t>28/05/2024</a:t>
             </a:fld>
             <a:endParaRPr lang="en-ID"/>
           </a:p>
@@ -2083,7 +2093,7 @@
           <a:p>
             <a:fld id="{5F6EB6D4-30B6-4E78-BDD6-1950D418B165}" type="datetimeFigureOut">
               <a:rPr lang="en-ID" smtClean="0"/>
-              <a:t>27/05/2024</a:t>
+              <a:t>28/05/2024</a:t>
             </a:fld>
             <a:endParaRPr lang="en-ID"/>
           </a:p>
@@ -2396,7 +2406,7 @@
           <a:p>
             <a:fld id="{5F6EB6D4-30B6-4E78-BDD6-1950D418B165}" type="datetimeFigureOut">
               <a:rPr lang="en-ID" smtClean="0"/>
-              <a:t>27/05/2024</a:t>
+              <a:t>28/05/2024</a:t>
             </a:fld>
             <a:endParaRPr lang="en-ID"/>
           </a:p>
@@ -2685,7 +2695,7 @@
           <a:p>
             <a:fld id="{5F6EB6D4-30B6-4E78-BDD6-1950D418B165}" type="datetimeFigureOut">
               <a:rPr lang="en-ID" smtClean="0"/>
-              <a:t>27/05/2024</a:t>
+              <a:t>28/05/2024</a:t>
             </a:fld>
             <a:endParaRPr lang="en-ID"/>
           </a:p>
@@ -2928,7 +2938,7 @@
           <a:p>
             <a:fld id="{5F6EB6D4-30B6-4E78-BDD6-1950D418B165}" type="datetimeFigureOut">
               <a:rPr lang="en-ID" smtClean="0"/>
-              <a:t>27/05/2024</a:t>
+              <a:t>28/05/2024</a:t>
             </a:fld>
             <a:endParaRPr lang="en-ID"/>
           </a:p>
@@ -3350,7 +3360,7 @@
           <p:cNvPr id="2" name="Title 1">
             <a:extLst>
               <a:ext uri="{FF2B5EF4-FFF2-40B4-BE49-F238E27FC236}">
-                <a16:creationId xmlns:a16="http://schemas.microsoft.com/office/drawing/2014/main" id="{B53A274F-2D6D-1054-64B8-81343DC815C4}"/>
+                <a16:creationId xmlns:a16="http://schemas.microsoft.com/office/drawing/2014/main" id="{407AECD1-449F-D8D9-D9E9-2FFADD145BCE}"/>
               </a:ext>
             </a:extLst>
           </p:cNvPr>
@@ -3366,123 +3376,43 @@
           <a:bodyPr/>
           <a:lstStyle/>
           <a:p>
-            <a:r>
-              <a:rPr lang="en-US" dirty="0"/>
-              <a:t>dataset</a:t>
-            </a:r>
-            <a:endParaRPr lang="en-ID" dirty="0"/>
-          </a:p>
-        </p:txBody>
-      </p:sp>
-      <p:sp>
-        <p:nvSpPr>
-          <p:cNvPr id="3" name="Content Placeholder 2">
-            <a:extLst>
-              <a:ext uri="{FF2B5EF4-FFF2-40B4-BE49-F238E27FC236}">
-                <a16:creationId xmlns:a16="http://schemas.microsoft.com/office/drawing/2014/main" id="{39C872E1-9E40-38BC-E0B0-CA60EE22F4E4}"/>
-              </a:ext>
-            </a:extLst>
-          </p:cNvPr>
-          <p:cNvSpPr>
-            <a:spLocks noGrp="1"/>
-          </p:cNvSpPr>
+            <a:endParaRPr lang="en-ID"/>
+          </a:p>
+        </p:txBody>
+      </p:sp>
+      <p:pic>
+        <p:nvPicPr>
+          <p:cNvPr id="5" name="Content Placeholder 4">
+            <a:extLst>
+              <a:ext uri="{FF2B5EF4-FFF2-40B4-BE49-F238E27FC236}">
+                <a16:creationId xmlns:a16="http://schemas.microsoft.com/office/drawing/2014/main" id="{487F4F61-8437-A3A9-ADC3-B3E6A3F0C1F2}"/>
+              </a:ext>
+            </a:extLst>
+          </p:cNvPr>
+          <p:cNvPicPr>
+            <a:picLocks noGrp="1" noChangeAspect="1"/>
+          </p:cNvPicPr>
           <p:nvPr>
             <p:ph idx="1"/>
           </p:nvPr>
-        </p:nvSpPr>
-        <p:spPr/>
-        <p:txBody>
-          <a:bodyPr>
-            <a:normAutofit fontScale="92500" lnSpcReduction="10000"/>
-          </a:bodyPr>
-          <a:lstStyle/>
-          <a:p>
-            <a:r>
-              <a:rPr lang="en-US" dirty="0"/>
-              <a:t>Income Statement</a:t>
-            </a:r>
-          </a:p>
-          <a:p>
-            <a:pPr lvl="1"/>
-            <a:r>
-              <a:rPr lang="en-US" b="1" dirty="0"/>
-              <a:t>Total Revenue</a:t>
-            </a:r>
-          </a:p>
-          <a:p>
-            <a:pPr lvl="1"/>
-            <a:r>
-              <a:rPr lang="en-US" b="1" dirty="0"/>
-              <a:t>Net Income</a:t>
-            </a:r>
-          </a:p>
-          <a:p>
-            <a:pPr lvl="1"/>
-            <a:r>
-              <a:rPr lang="en-US" dirty="0"/>
-              <a:t>Net Margin %</a:t>
-            </a:r>
-          </a:p>
-          <a:p>
-            <a:r>
-              <a:rPr lang="en-US" dirty="0"/>
-              <a:t>Balance Sheet</a:t>
-            </a:r>
-          </a:p>
-          <a:p>
-            <a:pPr lvl="1"/>
-            <a:r>
-              <a:rPr lang="en-US" b="1" dirty="0"/>
-              <a:t>Total Assets</a:t>
-            </a:r>
-          </a:p>
-          <a:p>
-            <a:pPr lvl="1"/>
-            <a:r>
-              <a:rPr lang="en-US" b="1" dirty="0"/>
-              <a:t>Total Liabilities</a:t>
-            </a:r>
-          </a:p>
-          <a:p>
-            <a:pPr lvl="1"/>
-            <a:r>
-              <a:rPr lang="en-US" dirty="0"/>
-              <a:t>Liabilities to Assets %</a:t>
-            </a:r>
-          </a:p>
-          <a:p>
-            <a:r>
-              <a:rPr lang="en-US" dirty="0"/>
-              <a:t>Cash Flow</a:t>
-            </a:r>
-          </a:p>
-          <a:p>
-            <a:pPr lvl="1"/>
-            <a:r>
-              <a:rPr lang="en-US" b="1" dirty="0"/>
-              <a:t>Operating Cash Flow / Cash Flow (contains Operating) </a:t>
-            </a:r>
-          </a:p>
-          <a:p>
-            <a:pPr lvl="1"/>
-            <a:r>
-              <a:rPr lang="en-US" b="1" dirty="0"/>
-              <a:t>Investing Cash Flow</a:t>
-            </a:r>
-          </a:p>
-          <a:p>
-            <a:pPr lvl="1"/>
-            <a:r>
-              <a:rPr lang="en-US" b="1" dirty="0"/>
-              <a:t>Financing Cash Flow</a:t>
-            </a:r>
-          </a:p>
-        </p:txBody>
-      </p:sp>
+        </p:nvPicPr>
+        <p:blipFill>
+          <a:blip r:embed="rId2"/>
+          <a:stretch>
+            <a:fillRect/>
+          </a:stretch>
+        </p:blipFill>
+        <p:spPr>
+          <a:xfrm>
+            <a:off x="890587" y="2158206"/>
+            <a:ext cx="10410825" cy="3686175"/>
+          </a:xfrm>
+        </p:spPr>
+      </p:pic>
     </p:spTree>
     <p:extLst>
       <p:ext uri="{BB962C8B-B14F-4D97-AF65-F5344CB8AC3E}">
-        <p14:creationId xmlns:p14="http://schemas.microsoft.com/office/powerpoint/2010/main" val="1953535558"/>
+        <p14:creationId xmlns:p14="http://schemas.microsoft.com/office/powerpoint/2010/main" val="2820475843"/>
       </p:ext>
     </p:extLst>
   </p:cSld>
@@ -3511,461 +3441,62 @@
       </p:grpSpPr>
       <p:sp>
         <p:nvSpPr>
-          <p:cNvPr id="3" name="Content Placeholder 2">
-            <a:extLst>
-              <a:ext uri="{FF2B5EF4-FFF2-40B4-BE49-F238E27FC236}">
-                <a16:creationId xmlns:a16="http://schemas.microsoft.com/office/drawing/2014/main" id="{3700907F-A643-43A3-F64D-0FFE45306189}"/>
-              </a:ext>
-            </a:extLst>
-          </p:cNvPr>
-          <p:cNvSpPr>
-            <a:spLocks noGrp="1"/>
-          </p:cNvSpPr>
+          <p:cNvPr id="2" name="Title 1">
+            <a:extLst>
+              <a:ext uri="{FF2B5EF4-FFF2-40B4-BE49-F238E27FC236}">
+                <a16:creationId xmlns:a16="http://schemas.microsoft.com/office/drawing/2014/main" id="{D7649A39-7131-291B-21AB-E999BA98B6B1}"/>
+              </a:ext>
+            </a:extLst>
+          </p:cNvPr>
+          <p:cNvSpPr>
+            <a:spLocks noGrp="1"/>
+          </p:cNvSpPr>
+          <p:nvPr>
+            <p:ph type="title"/>
+          </p:nvPr>
+        </p:nvSpPr>
+        <p:spPr/>
+        <p:txBody>
+          <a:bodyPr/>
+          <a:lstStyle/>
+          <a:p>
+            <a:endParaRPr lang="en-ID"/>
+          </a:p>
+        </p:txBody>
+      </p:sp>
+      <p:pic>
+        <p:nvPicPr>
+          <p:cNvPr id="5" name="Content Placeholder 4">
+            <a:extLst>
+              <a:ext uri="{FF2B5EF4-FFF2-40B4-BE49-F238E27FC236}">
+                <a16:creationId xmlns:a16="http://schemas.microsoft.com/office/drawing/2014/main" id="{4ADFB63B-216B-8135-787D-4C75C620FB49}"/>
+              </a:ext>
+            </a:extLst>
+          </p:cNvPr>
+          <p:cNvPicPr>
+            <a:picLocks noGrp="1" noChangeAspect="1"/>
+          </p:cNvPicPr>
           <p:nvPr>
             <p:ph idx="1"/>
           </p:nvPr>
-        </p:nvSpPr>
-        <p:spPr/>
-        <p:txBody>
-          <a:bodyPr>
-            <a:normAutofit fontScale="25000" lnSpcReduction="20000"/>
-          </a:bodyPr>
-          <a:lstStyle/>
-          <a:p>
-            <a:r>
-              <a:rPr lang="en-ID" dirty="0" err="1"/>
-              <a:t>Tabel</a:t>
-            </a:r>
-            <a:r>
-              <a:rPr lang="en-ID" dirty="0"/>
-              <a:t> </a:t>
-            </a:r>
-            <a:r>
-              <a:rPr lang="en-ID" dirty="0" err="1"/>
-              <a:t>Dimensi</a:t>
-            </a:r>
-            <a:endParaRPr lang="en-ID" dirty="0"/>
-          </a:p>
-          <a:p>
-            <a:r>
-              <a:rPr lang="en-ID" dirty="0" err="1"/>
-              <a:t>DimCompany</a:t>
-            </a:r>
-            <a:r>
-              <a:rPr lang="en-ID" dirty="0"/>
-              <a:t>: </a:t>
-            </a:r>
-            <a:r>
-              <a:rPr lang="en-ID" dirty="0" err="1"/>
-              <a:t>Berisi</a:t>
-            </a:r>
-            <a:r>
-              <a:rPr lang="en-ID" dirty="0"/>
-              <a:t> </a:t>
-            </a:r>
-            <a:r>
-              <a:rPr lang="en-ID" dirty="0" err="1"/>
-              <a:t>informasi</a:t>
-            </a:r>
-            <a:r>
-              <a:rPr lang="en-ID" dirty="0"/>
-              <a:t> </a:t>
-            </a:r>
-            <a:r>
-              <a:rPr lang="en-ID" dirty="0" err="1"/>
-              <a:t>tentang</a:t>
-            </a:r>
-            <a:r>
-              <a:rPr lang="en-ID" dirty="0"/>
-              <a:t> </a:t>
-            </a:r>
-            <a:r>
-              <a:rPr lang="en-ID" dirty="0" err="1"/>
-              <a:t>perusahaan</a:t>
-            </a:r>
-            <a:r>
-              <a:rPr lang="en-ID" dirty="0"/>
-              <a:t>.</a:t>
-            </a:r>
-          </a:p>
-          <a:p>
-            <a:endParaRPr lang="en-ID" dirty="0"/>
-          </a:p>
-          <a:p>
-            <a:r>
-              <a:rPr lang="en-ID" dirty="0" err="1"/>
-              <a:t>CompanyID</a:t>
-            </a:r>
-            <a:r>
-              <a:rPr lang="en-ID" dirty="0"/>
-              <a:t> (Primary Key)</a:t>
-            </a:r>
-          </a:p>
-          <a:p>
-            <a:r>
-              <a:rPr lang="en-ID" dirty="0"/>
-              <a:t>Symbol (Company stock symbol)</a:t>
-            </a:r>
-          </a:p>
-          <a:p>
-            <a:r>
-              <a:rPr lang="en-ID" dirty="0" err="1"/>
-              <a:t>CompanyName</a:t>
-            </a:r>
-            <a:r>
-              <a:rPr lang="en-ID" dirty="0"/>
-              <a:t> (Nama </a:t>
-            </a:r>
-            <a:r>
-              <a:rPr lang="en-ID" dirty="0" err="1"/>
-              <a:t>perusahaan</a:t>
-            </a:r>
-            <a:r>
-              <a:rPr lang="en-ID" dirty="0"/>
-              <a:t>, </a:t>
-            </a:r>
-            <a:r>
-              <a:rPr lang="en-ID" dirty="0" err="1"/>
-              <a:t>jika</a:t>
-            </a:r>
-            <a:r>
-              <a:rPr lang="en-ID" dirty="0"/>
-              <a:t> </a:t>
-            </a:r>
-            <a:r>
-              <a:rPr lang="en-ID" dirty="0" err="1"/>
-              <a:t>ada</a:t>
-            </a:r>
-            <a:r>
-              <a:rPr lang="en-ID" dirty="0"/>
-              <a:t>)</a:t>
-            </a:r>
-          </a:p>
-          <a:p>
-            <a:r>
-              <a:rPr lang="en-ID" dirty="0" err="1"/>
-              <a:t>DimAccount</a:t>
-            </a:r>
-            <a:r>
-              <a:rPr lang="en-ID" dirty="0"/>
-              <a:t>: </a:t>
-            </a:r>
-            <a:r>
-              <a:rPr lang="en-ID" dirty="0" err="1"/>
-              <a:t>Berisi</a:t>
-            </a:r>
-            <a:r>
-              <a:rPr lang="en-ID" dirty="0"/>
-              <a:t> </a:t>
-            </a:r>
-            <a:r>
-              <a:rPr lang="en-ID" dirty="0" err="1"/>
-              <a:t>jenis</a:t>
-            </a:r>
-            <a:r>
-              <a:rPr lang="en-ID" dirty="0"/>
-              <a:t> </a:t>
-            </a:r>
-            <a:r>
-              <a:rPr lang="en-ID" dirty="0" err="1"/>
-              <a:t>akun</a:t>
-            </a:r>
-            <a:r>
-              <a:rPr lang="en-ID" dirty="0"/>
-              <a:t> </a:t>
-            </a:r>
-            <a:r>
-              <a:rPr lang="en-ID" dirty="0" err="1"/>
-              <a:t>dalam</a:t>
-            </a:r>
-            <a:r>
-              <a:rPr lang="en-ID" dirty="0"/>
-              <a:t> </a:t>
-            </a:r>
-            <a:r>
-              <a:rPr lang="en-ID" dirty="0" err="1"/>
-              <a:t>laporan</a:t>
-            </a:r>
-            <a:r>
-              <a:rPr lang="en-ID" dirty="0"/>
-              <a:t> </a:t>
-            </a:r>
-            <a:r>
-              <a:rPr lang="en-ID" dirty="0" err="1"/>
-              <a:t>keuangan</a:t>
-            </a:r>
-            <a:r>
-              <a:rPr lang="en-ID" dirty="0"/>
-              <a:t>.</a:t>
-            </a:r>
-          </a:p>
-          <a:p>
-            <a:endParaRPr lang="en-ID" dirty="0"/>
-          </a:p>
-          <a:p>
-            <a:r>
-              <a:rPr lang="en-ID" dirty="0" err="1"/>
-              <a:t>AccountID</a:t>
-            </a:r>
-            <a:r>
-              <a:rPr lang="en-ID" dirty="0"/>
-              <a:t> (Primary Key)</a:t>
-            </a:r>
-          </a:p>
-          <a:p>
-            <a:r>
-              <a:rPr lang="en-ID" dirty="0" err="1"/>
-              <a:t>AccountName</a:t>
-            </a:r>
-            <a:r>
-              <a:rPr lang="en-ID" dirty="0"/>
-              <a:t> (Nama </a:t>
-            </a:r>
-            <a:r>
-              <a:rPr lang="en-ID" dirty="0" err="1"/>
-              <a:t>akun</a:t>
-            </a:r>
-            <a:r>
-              <a:rPr lang="en-ID" dirty="0"/>
-              <a:t>, </a:t>
-            </a:r>
-            <a:r>
-              <a:rPr lang="en-ID" dirty="0" err="1"/>
-              <a:t>seperti</a:t>
-            </a:r>
-            <a:r>
-              <a:rPr lang="en-ID" dirty="0"/>
-              <a:t> "Accounts Payable", "Accounts Receivable", </a:t>
-            </a:r>
-            <a:r>
-              <a:rPr lang="en-ID" dirty="0" err="1"/>
-              <a:t>dll</a:t>
-            </a:r>
-            <a:r>
-              <a:rPr lang="en-ID" dirty="0"/>
-              <a:t>.)</a:t>
-            </a:r>
-          </a:p>
-          <a:p>
-            <a:r>
-              <a:rPr lang="en-ID" dirty="0" err="1"/>
-              <a:t>DimReportType</a:t>
-            </a:r>
-            <a:r>
-              <a:rPr lang="en-ID" dirty="0"/>
-              <a:t>: </a:t>
-            </a:r>
-            <a:r>
-              <a:rPr lang="en-ID" dirty="0" err="1"/>
-              <a:t>Berisi</a:t>
-            </a:r>
-            <a:r>
-              <a:rPr lang="en-ID" dirty="0"/>
-              <a:t> </a:t>
-            </a:r>
-            <a:r>
-              <a:rPr lang="en-ID" dirty="0" err="1"/>
-              <a:t>jenis</a:t>
-            </a:r>
-            <a:r>
-              <a:rPr lang="en-ID" dirty="0"/>
-              <a:t> </a:t>
-            </a:r>
-            <a:r>
-              <a:rPr lang="en-ID" dirty="0" err="1"/>
-              <a:t>laporan</a:t>
-            </a:r>
-            <a:r>
-              <a:rPr lang="en-ID" dirty="0"/>
-              <a:t> </a:t>
-            </a:r>
-            <a:r>
-              <a:rPr lang="en-ID" dirty="0" err="1"/>
-              <a:t>keuangan</a:t>
-            </a:r>
-            <a:r>
-              <a:rPr lang="en-ID" dirty="0"/>
-              <a:t>.</a:t>
-            </a:r>
-          </a:p>
-          <a:p>
-            <a:endParaRPr lang="en-ID" dirty="0"/>
-          </a:p>
-          <a:p>
-            <a:r>
-              <a:rPr lang="en-ID" dirty="0" err="1"/>
-              <a:t>ReportTypeID</a:t>
-            </a:r>
-            <a:r>
-              <a:rPr lang="en-ID" dirty="0"/>
-              <a:t> (Primary Key)</a:t>
-            </a:r>
-          </a:p>
-          <a:p>
-            <a:r>
-              <a:rPr lang="en-ID" dirty="0" err="1"/>
-              <a:t>ReportType</a:t>
-            </a:r>
-            <a:r>
-              <a:rPr lang="en-ID" dirty="0"/>
-              <a:t> (</a:t>
-            </a:r>
-            <a:r>
-              <a:rPr lang="en-ID" dirty="0" err="1"/>
-              <a:t>Jenis</a:t>
-            </a:r>
-            <a:r>
-              <a:rPr lang="en-ID" dirty="0"/>
-              <a:t> </a:t>
-            </a:r>
-            <a:r>
-              <a:rPr lang="en-ID" dirty="0" err="1"/>
-              <a:t>laporan</a:t>
-            </a:r>
-            <a:r>
-              <a:rPr lang="en-ID" dirty="0"/>
-              <a:t>, </a:t>
-            </a:r>
-            <a:r>
-              <a:rPr lang="en-ID" dirty="0" err="1"/>
-              <a:t>seperti</a:t>
-            </a:r>
-            <a:r>
-              <a:rPr lang="en-ID" dirty="0"/>
-              <a:t> "BS" </a:t>
-            </a:r>
-            <a:r>
-              <a:rPr lang="en-ID" dirty="0" err="1"/>
-              <a:t>untuk</a:t>
-            </a:r>
-            <a:r>
-              <a:rPr lang="en-ID" dirty="0"/>
-              <a:t> Balance Sheet, "CF" </a:t>
-            </a:r>
-            <a:r>
-              <a:rPr lang="en-ID" dirty="0" err="1"/>
-              <a:t>untuk</a:t>
-            </a:r>
-            <a:r>
-              <a:rPr lang="en-ID" dirty="0"/>
-              <a:t> Cash Flow, "IS" </a:t>
-            </a:r>
-            <a:r>
-              <a:rPr lang="en-ID" dirty="0" err="1"/>
-              <a:t>untuk</a:t>
-            </a:r>
-            <a:r>
-              <a:rPr lang="en-ID" dirty="0"/>
-              <a:t> Income Statement)</a:t>
-            </a:r>
-          </a:p>
-          <a:p>
-            <a:r>
-              <a:rPr lang="en-ID" dirty="0" err="1"/>
-              <a:t>DimDate</a:t>
-            </a:r>
-            <a:r>
-              <a:rPr lang="en-ID" dirty="0"/>
-              <a:t>: </a:t>
-            </a:r>
-            <a:r>
-              <a:rPr lang="en-ID" dirty="0" err="1"/>
-              <a:t>Berisi</a:t>
-            </a:r>
-            <a:r>
-              <a:rPr lang="en-ID" dirty="0"/>
-              <a:t> </a:t>
-            </a:r>
-            <a:r>
-              <a:rPr lang="en-ID" dirty="0" err="1"/>
-              <a:t>informasi</a:t>
-            </a:r>
-            <a:r>
-              <a:rPr lang="en-ID" dirty="0"/>
-              <a:t> </a:t>
-            </a:r>
-            <a:r>
-              <a:rPr lang="en-ID" dirty="0" err="1"/>
-              <a:t>tentang</a:t>
-            </a:r>
-            <a:r>
-              <a:rPr lang="en-ID" dirty="0"/>
-              <a:t> </a:t>
-            </a:r>
-            <a:r>
-              <a:rPr lang="en-ID" dirty="0" err="1"/>
-              <a:t>tanggal</a:t>
-            </a:r>
-            <a:r>
-              <a:rPr lang="en-ID" dirty="0"/>
-              <a:t>.</a:t>
-            </a:r>
-          </a:p>
-          <a:p>
-            <a:endParaRPr lang="en-ID" dirty="0"/>
-          </a:p>
-          <a:p>
-            <a:r>
-              <a:rPr lang="en-ID" dirty="0" err="1"/>
-              <a:t>DateID</a:t>
-            </a:r>
-            <a:r>
-              <a:rPr lang="en-ID" dirty="0"/>
-              <a:t> (Primary Key)</a:t>
-            </a:r>
-          </a:p>
-          <a:p>
-            <a:r>
-              <a:rPr lang="en-ID" dirty="0"/>
-              <a:t>Date (</a:t>
-            </a:r>
-            <a:r>
-              <a:rPr lang="en-ID" dirty="0" err="1"/>
-              <a:t>Tanggal</a:t>
-            </a:r>
-            <a:r>
-              <a:rPr lang="en-ID" dirty="0"/>
-              <a:t> </a:t>
-            </a:r>
-            <a:r>
-              <a:rPr lang="en-ID" dirty="0" err="1"/>
-              <a:t>lengkap</a:t>
-            </a:r>
-            <a:r>
-              <a:rPr lang="en-ID" dirty="0"/>
-              <a:t>)</a:t>
-            </a:r>
-          </a:p>
-          <a:p>
-            <a:r>
-              <a:rPr lang="en-ID" dirty="0"/>
-              <a:t>Year</a:t>
-            </a:r>
-          </a:p>
-          <a:p>
-            <a:r>
-              <a:rPr lang="en-ID" dirty="0"/>
-              <a:t>Month</a:t>
-            </a:r>
-          </a:p>
-          <a:p>
-            <a:r>
-              <a:rPr lang="en-ID" dirty="0"/>
-              <a:t>Day</a:t>
-            </a:r>
-          </a:p>
-          <a:p>
-            <a:r>
-              <a:rPr lang="en-ID" dirty="0"/>
-              <a:t>Quarter</a:t>
-            </a:r>
-          </a:p>
-        </p:txBody>
-      </p:sp>
+        </p:nvPicPr>
+        <p:blipFill>
+          <a:blip r:embed="rId2"/>
+          <a:stretch>
+            <a:fillRect/>
+          </a:stretch>
+        </p:blipFill>
+        <p:spPr>
+          <a:xfrm>
+            <a:off x="2594623" y="1825625"/>
+            <a:ext cx="7002753" cy="4351338"/>
+          </a:xfrm>
+        </p:spPr>
+      </p:pic>
     </p:spTree>
     <p:extLst>
       <p:ext uri="{BB962C8B-B14F-4D97-AF65-F5344CB8AC3E}">
-        <p14:creationId xmlns:p14="http://schemas.microsoft.com/office/powerpoint/2010/main" val="2943174865"/>
+        <p14:creationId xmlns:p14="http://schemas.microsoft.com/office/powerpoint/2010/main" val="4233992406"/>
       </p:ext>
     </p:extLst>
   </p:cSld>
@@ -3994,572 +3525,134 @@
       </p:grpSpPr>
       <p:sp>
         <p:nvSpPr>
-          <p:cNvPr id="7" name="TextBox 6">
-            <a:extLst>
-              <a:ext uri="{FF2B5EF4-FFF2-40B4-BE49-F238E27FC236}">
-                <a16:creationId xmlns:a16="http://schemas.microsoft.com/office/drawing/2014/main" id="{94116C3D-27E5-10B9-DFD2-D09539F38512}"/>
-              </a:ext>
-            </a:extLst>
-          </p:cNvPr>
-          <p:cNvSpPr txBox="1"/>
-          <p:nvPr/>
-        </p:nvSpPr>
-        <p:spPr>
-          <a:xfrm>
-            <a:off x="1131216" y="-215796"/>
-            <a:ext cx="10963374" cy="6740307"/>
-          </a:xfrm>
-          <a:prstGeom prst="rect">
-            <a:avLst/>
-          </a:prstGeom>
-          <a:noFill/>
-        </p:spPr>
-        <p:txBody>
-          <a:bodyPr wrap="square">
-            <a:spAutoFit/>
+          <p:cNvPr id="2" name="Title 1">
+            <a:extLst>
+              <a:ext uri="{FF2B5EF4-FFF2-40B4-BE49-F238E27FC236}">
+                <a16:creationId xmlns:a16="http://schemas.microsoft.com/office/drawing/2014/main" id="{B53A274F-2D6D-1054-64B8-81343DC815C4}"/>
+              </a:ext>
+            </a:extLst>
+          </p:cNvPr>
+          <p:cNvSpPr>
+            <a:spLocks noGrp="1"/>
+          </p:cNvSpPr>
+          <p:nvPr>
+            <p:ph type="title"/>
+          </p:nvPr>
+        </p:nvSpPr>
+        <p:spPr/>
+        <p:txBody>
+          <a:bodyPr/>
+          <a:lstStyle/>
+          <a:p>
+            <a:r>
+              <a:rPr lang="en-US" dirty="0"/>
+              <a:t>dataset</a:t>
+            </a:r>
+            <a:endParaRPr lang="en-ID" dirty="0"/>
+          </a:p>
+        </p:txBody>
+      </p:sp>
+      <p:sp>
+        <p:nvSpPr>
+          <p:cNvPr id="3" name="Content Placeholder 2">
+            <a:extLst>
+              <a:ext uri="{FF2B5EF4-FFF2-40B4-BE49-F238E27FC236}">
+                <a16:creationId xmlns:a16="http://schemas.microsoft.com/office/drawing/2014/main" id="{39C872E1-9E40-38BC-E0B0-CA60EE22F4E4}"/>
+              </a:ext>
+            </a:extLst>
+          </p:cNvPr>
+          <p:cNvSpPr>
+            <a:spLocks noGrp="1"/>
+          </p:cNvSpPr>
+          <p:nvPr>
+            <p:ph idx="1"/>
+          </p:nvPr>
+        </p:nvSpPr>
+        <p:spPr/>
+        <p:txBody>
+          <a:bodyPr>
+            <a:normAutofit fontScale="92500" lnSpcReduction="10000"/>
           </a:bodyPr>
           <a:lstStyle/>
           <a:p>
-            <a:endParaRPr lang="en-ID" dirty="0"/>
-          </a:p>
-          <a:p>
-            <a:r>
-              <a:rPr lang="en-ID" dirty="0" err="1"/>
-              <a:t>Tabel</a:t>
-            </a:r>
-            <a:r>
-              <a:rPr lang="en-ID" dirty="0"/>
-              <a:t> Fakta</a:t>
-            </a:r>
-          </a:p>
-          <a:p>
-            <a:r>
-              <a:rPr lang="en-ID" dirty="0" err="1"/>
-              <a:t>FactFinancials</a:t>
-            </a:r>
-            <a:r>
-              <a:rPr lang="en-ID" dirty="0"/>
-              <a:t>: </a:t>
-            </a:r>
-            <a:r>
-              <a:rPr lang="en-ID" dirty="0" err="1"/>
-              <a:t>Berisi</a:t>
-            </a:r>
-            <a:r>
-              <a:rPr lang="en-ID" dirty="0"/>
-              <a:t> data </a:t>
-            </a:r>
-            <a:r>
-              <a:rPr lang="en-ID" dirty="0" err="1"/>
-              <a:t>laporan</a:t>
-            </a:r>
-            <a:r>
-              <a:rPr lang="en-ID" dirty="0"/>
-              <a:t> </a:t>
-            </a:r>
-            <a:r>
-              <a:rPr lang="en-ID" dirty="0" err="1"/>
-              <a:t>keuangan</a:t>
-            </a:r>
-            <a:r>
-              <a:rPr lang="en-ID" dirty="0"/>
-              <a:t> </a:t>
-            </a:r>
-            <a:r>
-              <a:rPr lang="en-ID" dirty="0" err="1"/>
-              <a:t>dengan</a:t>
-            </a:r>
-            <a:r>
-              <a:rPr lang="en-ID" dirty="0"/>
-              <a:t> </a:t>
-            </a:r>
-            <a:r>
-              <a:rPr lang="en-ID" dirty="0" err="1"/>
-              <a:t>referensi</a:t>
-            </a:r>
-            <a:r>
-              <a:rPr lang="en-ID" dirty="0"/>
-              <a:t> </a:t>
-            </a:r>
-            <a:r>
-              <a:rPr lang="en-ID" dirty="0" err="1"/>
-              <a:t>ke</a:t>
-            </a:r>
-            <a:r>
-              <a:rPr lang="en-ID" dirty="0"/>
-              <a:t> </a:t>
-            </a:r>
-            <a:r>
-              <a:rPr lang="en-ID" dirty="0" err="1"/>
-              <a:t>tabel</a:t>
-            </a:r>
-            <a:r>
-              <a:rPr lang="en-ID" dirty="0"/>
-              <a:t> </a:t>
-            </a:r>
-            <a:r>
-              <a:rPr lang="en-ID" dirty="0" err="1"/>
-              <a:t>dimensi</a:t>
-            </a:r>
-            <a:r>
-              <a:rPr lang="en-ID" dirty="0"/>
-              <a:t>.</a:t>
-            </a:r>
-          </a:p>
-          <a:p>
-            <a:endParaRPr lang="en-ID" dirty="0"/>
-          </a:p>
-          <a:p>
-            <a:r>
-              <a:rPr lang="en-ID" dirty="0" err="1"/>
-              <a:t>FinancialID</a:t>
-            </a:r>
-            <a:r>
-              <a:rPr lang="en-ID" dirty="0"/>
-              <a:t> (Primary Key)</a:t>
-            </a:r>
-          </a:p>
-          <a:p>
-            <a:r>
-              <a:rPr lang="en-ID" dirty="0" err="1"/>
-              <a:t>CompanyID</a:t>
-            </a:r>
-            <a:r>
-              <a:rPr lang="en-ID" dirty="0"/>
-              <a:t> (Foreign Key </a:t>
-            </a:r>
-            <a:r>
-              <a:rPr lang="en-ID" dirty="0" err="1"/>
-              <a:t>ke</a:t>
-            </a:r>
-            <a:r>
-              <a:rPr lang="en-ID" dirty="0"/>
-              <a:t> </a:t>
-            </a:r>
-            <a:r>
-              <a:rPr lang="en-ID" dirty="0" err="1"/>
-              <a:t>DimCompany</a:t>
-            </a:r>
-            <a:r>
-              <a:rPr lang="en-ID" dirty="0"/>
-              <a:t>)</a:t>
-            </a:r>
-          </a:p>
-          <a:p>
-            <a:r>
-              <a:rPr lang="en-ID" dirty="0" err="1"/>
-              <a:t>AccountID</a:t>
-            </a:r>
-            <a:r>
-              <a:rPr lang="en-ID" dirty="0"/>
-              <a:t> (Foreign Key </a:t>
-            </a:r>
-            <a:r>
-              <a:rPr lang="en-ID" dirty="0" err="1"/>
-              <a:t>ke</a:t>
-            </a:r>
-            <a:r>
-              <a:rPr lang="en-ID" dirty="0"/>
-              <a:t> </a:t>
-            </a:r>
-            <a:r>
-              <a:rPr lang="en-ID" dirty="0" err="1"/>
-              <a:t>DimAccount</a:t>
-            </a:r>
-            <a:r>
-              <a:rPr lang="en-ID" dirty="0"/>
-              <a:t>)</a:t>
-            </a:r>
-          </a:p>
-          <a:p>
-            <a:r>
-              <a:rPr lang="en-ID" dirty="0" err="1"/>
-              <a:t>ReportTypeID</a:t>
-            </a:r>
-            <a:r>
-              <a:rPr lang="en-ID" dirty="0"/>
-              <a:t> (Foreign Key </a:t>
-            </a:r>
-            <a:r>
-              <a:rPr lang="en-ID" dirty="0" err="1"/>
-              <a:t>ke</a:t>
-            </a:r>
-            <a:r>
-              <a:rPr lang="en-ID" dirty="0"/>
-              <a:t> </a:t>
-            </a:r>
-            <a:r>
-              <a:rPr lang="en-ID" dirty="0" err="1"/>
-              <a:t>DimReportType</a:t>
-            </a:r>
-            <a:r>
-              <a:rPr lang="en-ID" dirty="0"/>
-              <a:t>)</a:t>
-            </a:r>
-          </a:p>
-          <a:p>
-            <a:r>
-              <a:rPr lang="en-ID" dirty="0"/>
-              <a:t>Year (</a:t>
-            </a:r>
-            <a:r>
-              <a:rPr lang="en-ID" dirty="0" err="1"/>
-              <a:t>Tahun</a:t>
-            </a:r>
-            <a:r>
-              <a:rPr lang="en-ID" dirty="0"/>
-              <a:t> </a:t>
-            </a:r>
-            <a:r>
-              <a:rPr lang="en-ID" dirty="0" err="1"/>
-              <a:t>laporan</a:t>
-            </a:r>
-            <a:r>
-              <a:rPr lang="en-ID" dirty="0"/>
-              <a:t> </a:t>
-            </a:r>
-            <a:r>
-              <a:rPr lang="en-ID" dirty="0" err="1"/>
-              <a:t>keuangan</a:t>
-            </a:r>
-            <a:r>
-              <a:rPr lang="en-ID" dirty="0"/>
-              <a:t>)</a:t>
-            </a:r>
-          </a:p>
-          <a:p>
-            <a:r>
-              <a:rPr lang="en-ID" dirty="0"/>
-              <a:t>Amount (Nilai </a:t>
-            </a:r>
-            <a:r>
-              <a:rPr lang="en-ID" dirty="0" err="1"/>
-              <a:t>laporan</a:t>
-            </a:r>
-            <a:r>
-              <a:rPr lang="en-ID" dirty="0"/>
-              <a:t> </a:t>
-            </a:r>
-            <a:r>
-              <a:rPr lang="en-ID" dirty="0" err="1"/>
-              <a:t>keuangan</a:t>
-            </a:r>
-            <a:r>
-              <a:rPr lang="en-ID" dirty="0"/>
-              <a:t>)</a:t>
-            </a:r>
-          </a:p>
-          <a:p>
-            <a:r>
-              <a:rPr lang="en-ID" dirty="0" err="1"/>
-              <a:t>FactStockPerformance</a:t>
-            </a:r>
-            <a:r>
-              <a:rPr lang="en-ID" dirty="0"/>
-              <a:t>: </a:t>
-            </a:r>
-            <a:r>
-              <a:rPr lang="en-ID" dirty="0" err="1"/>
-              <a:t>Berisi</a:t>
-            </a:r>
-            <a:r>
-              <a:rPr lang="en-ID" dirty="0"/>
-              <a:t> data </a:t>
-            </a:r>
-            <a:r>
-              <a:rPr lang="en-ID" dirty="0" err="1"/>
-              <a:t>kinerja</a:t>
-            </a:r>
-            <a:r>
-              <a:rPr lang="en-ID" dirty="0"/>
-              <a:t> </a:t>
-            </a:r>
-            <a:r>
-              <a:rPr lang="en-ID" dirty="0" err="1"/>
-              <a:t>saham</a:t>
-            </a:r>
-            <a:r>
-              <a:rPr lang="en-ID" dirty="0"/>
-              <a:t> </a:t>
-            </a:r>
-            <a:r>
-              <a:rPr lang="en-ID" dirty="0" err="1"/>
-              <a:t>harian</a:t>
-            </a:r>
-            <a:r>
-              <a:rPr lang="en-ID" dirty="0"/>
-              <a:t> </a:t>
-            </a:r>
-            <a:r>
-              <a:rPr lang="en-ID" dirty="0" err="1"/>
-              <a:t>dengan</a:t>
-            </a:r>
-            <a:r>
-              <a:rPr lang="en-ID" dirty="0"/>
-              <a:t> </a:t>
-            </a:r>
-            <a:r>
-              <a:rPr lang="en-ID" dirty="0" err="1"/>
-              <a:t>referensi</a:t>
-            </a:r>
-            <a:r>
-              <a:rPr lang="en-ID" dirty="0"/>
-              <a:t> </a:t>
-            </a:r>
-            <a:r>
-              <a:rPr lang="en-ID" dirty="0" err="1"/>
-              <a:t>ke</a:t>
-            </a:r>
-            <a:r>
-              <a:rPr lang="en-ID" dirty="0"/>
-              <a:t> </a:t>
-            </a:r>
-            <a:r>
-              <a:rPr lang="en-ID" dirty="0" err="1"/>
-              <a:t>tabel</a:t>
-            </a:r>
-            <a:r>
-              <a:rPr lang="en-ID" dirty="0"/>
-              <a:t> </a:t>
-            </a:r>
-            <a:r>
-              <a:rPr lang="en-ID" dirty="0" err="1"/>
-              <a:t>dimensi</a:t>
-            </a:r>
-            <a:r>
-              <a:rPr lang="en-ID" dirty="0"/>
-              <a:t>.</a:t>
-            </a:r>
-          </a:p>
-          <a:p>
-            <a:endParaRPr lang="en-ID" dirty="0"/>
-          </a:p>
-          <a:p>
-            <a:r>
-              <a:rPr lang="en-ID" dirty="0" err="1"/>
-              <a:t>PerformanceID</a:t>
-            </a:r>
-            <a:r>
-              <a:rPr lang="en-ID" dirty="0"/>
-              <a:t> (Primary Key)</a:t>
-            </a:r>
-          </a:p>
-          <a:p>
-            <a:r>
-              <a:rPr lang="en-ID" dirty="0" err="1"/>
-              <a:t>CompanyID</a:t>
-            </a:r>
-            <a:r>
-              <a:rPr lang="en-ID" dirty="0"/>
-              <a:t> (Foreign Key </a:t>
-            </a:r>
-            <a:r>
-              <a:rPr lang="en-ID" dirty="0" err="1"/>
-              <a:t>ke</a:t>
-            </a:r>
-            <a:r>
-              <a:rPr lang="en-ID" dirty="0"/>
-              <a:t> </a:t>
-            </a:r>
-            <a:r>
-              <a:rPr lang="en-ID" dirty="0" err="1"/>
-              <a:t>DimCompany</a:t>
-            </a:r>
-            <a:r>
-              <a:rPr lang="en-ID" dirty="0"/>
-              <a:t>)</a:t>
-            </a:r>
-          </a:p>
-          <a:p>
-            <a:r>
-              <a:rPr lang="en-ID" dirty="0" err="1"/>
-              <a:t>DateID</a:t>
-            </a:r>
-            <a:r>
-              <a:rPr lang="en-ID" dirty="0"/>
-              <a:t> (Foreign Key </a:t>
-            </a:r>
-            <a:r>
-              <a:rPr lang="en-ID" dirty="0" err="1"/>
-              <a:t>ke</a:t>
-            </a:r>
-            <a:r>
-              <a:rPr lang="en-ID" dirty="0"/>
-              <a:t> </a:t>
-            </a:r>
-            <a:r>
-              <a:rPr lang="en-ID" dirty="0" err="1"/>
-              <a:t>DimDate</a:t>
-            </a:r>
-            <a:r>
-              <a:rPr lang="en-ID" dirty="0"/>
-              <a:t>)</a:t>
-            </a:r>
-          </a:p>
-          <a:p>
-            <a:r>
-              <a:rPr lang="en-ID" dirty="0"/>
-              <a:t>Previous (Harga </a:t>
-            </a:r>
-            <a:r>
-              <a:rPr lang="en-ID" dirty="0" err="1"/>
-              <a:t>penutupan</a:t>
-            </a:r>
-            <a:r>
-              <a:rPr lang="en-ID" dirty="0"/>
-              <a:t> </a:t>
-            </a:r>
-            <a:r>
-              <a:rPr lang="en-ID" dirty="0" err="1"/>
-              <a:t>hari</a:t>
-            </a:r>
-            <a:r>
-              <a:rPr lang="en-ID" dirty="0"/>
-              <a:t> </a:t>
-            </a:r>
-            <a:r>
-              <a:rPr lang="en-ID" dirty="0" err="1"/>
-              <a:t>sebelumnya</a:t>
-            </a:r>
-            <a:r>
-              <a:rPr lang="en-ID" dirty="0"/>
-              <a:t>)</a:t>
-            </a:r>
-          </a:p>
-          <a:p>
-            <a:r>
-              <a:rPr lang="en-ID" dirty="0" err="1"/>
-              <a:t>OpenPrice</a:t>
-            </a:r>
-            <a:r>
-              <a:rPr lang="en-ID" dirty="0"/>
-              <a:t> (Harga </a:t>
-            </a:r>
-            <a:r>
-              <a:rPr lang="en-ID" dirty="0" err="1"/>
-              <a:t>pembukaan</a:t>
-            </a:r>
-            <a:r>
-              <a:rPr lang="en-ID" dirty="0"/>
-              <a:t>)</a:t>
-            </a:r>
-          </a:p>
-          <a:p>
-            <a:r>
-              <a:rPr lang="en-ID" dirty="0" err="1"/>
-              <a:t>FirstTrade</a:t>
-            </a:r>
-            <a:r>
-              <a:rPr lang="en-ID" dirty="0"/>
-              <a:t> (Harga </a:t>
-            </a:r>
-            <a:r>
-              <a:rPr lang="en-ID" dirty="0" err="1"/>
-              <a:t>perdagangan</a:t>
-            </a:r>
-            <a:r>
-              <a:rPr lang="en-ID" dirty="0"/>
-              <a:t> </a:t>
-            </a:r>
-            <a:r>
-              <a:rPr lang="en-ID" dirty="0" err="1"/>
-              <a:t>pertama</a:t>
-            </a:r>
-            <a:r>
-              <a:rPr lang="en-ID" dirty="0"/>
-              <a:t>)</a:t>
-            </a:r>
-          </a:p>
-          <a:p>
-            <a:r>
-              <a:rPr lang="en-ID" dirty="0"/>
-              <a:t>High (Harga </a:t>
-            </a:r>
-            <a:r>
-              <a:rPr lang="en-ID" dirty="0" err="1"/>
-              <a:t>tertinggi</a:t>
-            </a:r>
-            <a:r>
-              <a:rPr lang="en-ID" dirty="0"/>
-              <a:t>)</a:t>
-            </a:r>
-          </a:p>
-          <a:p>
-            <a:r>
-              <a:rPr lang="en-ID" dirty="0"/>
-              <a:t>Low (Harga </a:t>
-            </a:r>
-            <a:r>
-              <a:rPr lang="en-ID" dirty="0" err="1"/>
-              <a:t>terendah</a:t>
-            </a:r>
-            <a:r>
-              <a:rPr lang="en-ID" dirty="0"/>
-              <a:t>)</a:t>
-            </a:r>
-          </a:p>
-          <a:p>
-            <a:r>
-              <a:rPr lang="en-ID" dirty="0"/>
-              <a:t>Close (Harga </a:t>
-            </a:r>
-            <a:r>
-              <a:rPr lang="en-ID" dirty="0" err="1"/>
-              <a:t>penutupan</a:t>
-            </a:r>
-            <a:r>
-              <a:rPr lang="en-ID" dirty="0"/>
-              <a:t>)</a:t>
-            </a:r>
-          </a:p>
-          <a:p>
-            <a:r>
-              <a:rPr lang="en-ID" dirty="0"/>
-              <a:t>Change (</a:t>
-            </a:r>
-            <a:r>
-              <a:rPr lang="en-ID" dirty="0" err="1"/>
-              <a:t>Perubahan</a:t>
-            </a:r>
-            <a:r>
-              <a:rPr lang="en-ID" dirty="0"/>
-              <a:t> </a:t>
-            </a:r>
-            <a:r>
-              <a:rPr lang="en-ID" dirty="0" err="1"/>
-              <a:t>harga</a:t>
-            </a:r>
-            <a:r>
-              <a:rPr lang="en-ID" dirty="0"/>
-              <a:t>)</a:t>
-            </a:r>
-          </a:p>
-          <a:p>
-            <a:r>
-              <a:rPr lang="en-ID" dirty="0"/>
-              <a:t>Volume (Volume </a:t>
-            </a:r>
-            <a:r>
-              <a:rPr lang="en-ID" dirty="0" err="1"/>
-              <a:t>perdagangan</a:t>
-            </a:r>
-            <a:r>
-              <a:rPr lang="en-ID" dirty="0"/>
-              <a:t>)</a:t>
-            </a:r>
-          </a:p>
-          <a:p>
-            <a:r>
-              <a:rPr lang="en-ID" dirty="0"/>
-              <a:t>Value (Nilai </a:t>
-            </a:r>
-            <a:r>
-              <a:rPr lang="en-ID" dirty="0" err="1"/>
-              <a:t>perdagangan</a:t>
-            </a:r>
-            <a:r>
-              <a:rPr lang="en-ID" dirty="0"/>
-              <a:t>)</a:t>
+            <a:r>
+              <a:rPr lang="en-US" dirty="0"/>
+              <a:t>Income Statement</a:t>
+            </a:r>
+          </a:p>
+          <a:p>
+            <a:pPr lvl="1"/>
+            <a:r>
+              <a:rPr lang="en-US" b="1" dirty="0"/>
+              <a:t>Total Revenue</a:t>
+            </a:r>
+          </a:p>
+          <a:p>
+            <a:pPr lvl="1"/>
+            <a:r>
+              <a:rPr lang="en-US" b="1" dirty="0"/>
+              <a:t>Net Income</a:t>
+            </a:r>
+          </a:p>
+          <a:p>
+            <a:pPr lvl="1"/>
+            <a:r>
+              <a:rPr lang="en-US" dirty="0"/>
+              <a:t>Net Margin %</a:t>
+            </a:r>
+          </a:p>
+          <a:p>
+            <a:r>
+              <a:rPr lang="en-US" dirty="0"/>
+              <a:t>Balance Sheet</a:t>
+            </a:r>
+          </a:p>
+          <a:p>
+            <a:pPr lvl="1"/>
+            <a:r>
+              <a:rPr lang="en-US" b="1" dirty="0"/>
+              <a:t>Total Assets</a:t>
+            </a:r>
+          </a:p>
+          <a:p>
+            <a:pPr lvl="1"/>
+            <a:r>
+              <a:rPr lang="en-US" b="1" dirty="0"/>
+              <a:t>Total Liabilities</a:t>
+            </a:r>
+          </a:p>
+          <a:p>
+            <a:pPr lvl="1"/>
+            <a:r>
+              <a:rPr lang="en-US" dirty="0"/>
+              <a:t>Liabilities to Assets %</a:t>
+            </a:r>
+          </a:p>
+          <a:p>
+            <a:r>
+              <a:rPr lang="en-US" dirty="0"/>
+              <a:t>Cash Flow</a:t>
+            </a:r>
+          </a:p>
+          <a:p>
+            <a:pPr lvl="1"/>
+            <a:r>
+              <a:rPr lang="en-US" b="1" dirty="0"/>
+              <a:t>Operating Cash Flow / Cash Flow (contains Operating) </a:t>
+            </a:r>
+          </a:p>
+          <a:p>
+            <a:pPr lvl="1"/>
+            <a:r>
+              <a:rPr lang="en-US" b="1" dirty="0"/>
+              <a:t>Investing Cash Flow</a:t>
+            </a:r>
+          </a:p>
+          <a:p>
+            <a:pPr lvl="1"/>
+            <a:r>
+              <a:rPr lang="en-US" b="1" dirty="0"/>
+              <a:t>Financing Cash Flow</a:t>
             </a:r>
           </a:p>
         </p:txBody>
@@ -4567,7 +3660,7 @@
     </p:spTree>
     <p:extLst>
       <p:ext uri="{BB962C8B-B14F-4D97-AF65-F5344CB8AC3E}">
-        <p14:creationId xmlns:p14="http://schemas.microsoft.com/office/powerpoint/2010/main" val="159789220"/>
+        <p14:creationId xmlns:p14="http://schemas.microsoft.com/office/powerpoint/2010/main" val="1953535558"/>
       </p:ext>
     </p:extLst>
   </p:cSld>
@@ -4642,932 +3735,64 @@
         <p:spPr/>
         <p:txBody>
           <a:bodyPr>
-            <a:normAutofit fontScale="40000" lnSpcReduction="20000"/>
+            <a:normAutofit lnSpcReduction="10000"/>
           </a:bodyPr>
           <a:lstStyle/>
           <a:p>
             <a:r>
-              <a:rPr lang="en-ID" dirty="0" err="1"/>
-              <a:t>Tren</a:t>
-            </a:r>
-            <a:r>
-              <a:rPr lang="en-ID" dirty="0"/>
-              <a:t> </a:t>
-            </a:r>
-            <a:r>
-              <a:rPr lang="en-ID" dirty="0" err="1"/>
-              <a:t>Keuangan</a:t>
-            </a:r>
-            <a:r>
-              <a:rPr lang="en-ID" dirty="0"/>
-              <a:t> dan Harga Saham Perusahaan</a:t>
-            </a:r>
-          </a:p>
-          <a:p>
-            <a:endParaRPr lang="en-ID" dirty="0"/>
-          </a:p>
-          <a:p>
-            <a:r>
-              <a:rPr lang="en-ID" dirty="0" err="1"/>
-              <a:t>Bagaimana</a:t>
-            </a:r>
-            <a:r>
-              <a:rPr lang="en-ID" dirty="0"/>
-              <a:t> </a:t>
-            </a:r>
-            <a:r>
-              <a:rPr lang="en-ID" dirty="0" err="1"/>
-              <a:t>perubahan</a:t>
-            </a:r>
-            <a:r>
-              <a:rPr lang="en-ID" dirty="0"/>
-              <a:t> </a:t>
-            </a:r>
-            <a:r>
-              <a:rPr lang="en-ID" dirty="0" err="1"/>
-              <a:t>nilai</a:t>
-            </a:r>
-            <a:r>
-              <a:rPr lang="en-ID" dirty="0"/>
-              <a:t> total </a:t>
-            </a:r>
-            <a:r>
-              <a:rPr lang="en-ID" dirty="0" err="1"/>
-              <a:t>aset</a:t>
-            </a:r>
-            <a:r>
-              <a:rPr lang="en-ID" dirty="0"/>
-              <a:t>, </a:t>
-            </a:r>
-            <a:r>
-              <a:rPr lang="en-ID" dirty="0" err="1"/>
-              <a:t>kewajiban</a:t>
-            </a:r>
-            <a:r>
-              <a:rPr lang="en-ID" dirty="0"/>
-              <a:t>, dan </a:t>
-            </a:r>
-            <a:r>
-              <a:rPr lang="en-ID" dirty="0" err="1"/>
-              <a:t>ekuitas</a:t>
-            </a:r>
-            <a:r>
-              <a:rPr lang="en-ID" dirty="0"/>
-              <a:t> </a:t>
-            </a:r>
-            <a:r>
-              <a:rPr lang="en-ID" dirty="0" err="1"/>
-              <a:t>perusahaan</a:t>
-            </a:r>
-            <a:r>
-              <a:rPr lang="en-ID" dirty="0"/>
-              <a:t> </a:t>
-            </a:r>
-            <a:r>
-              <a:rPr lang="en-ID" dirty="0" err="1"/>
-              <a:t>dari</a:t>
-            </a:r>
-            <a:r>
-              <a:rPr lang="en-ID" dirty="0"/>
-              <a:t> </a:t>
-            </a:r>
-            <a:r>
-              <a:rPr lang="en-ID" dirty="0" err="1"/>
-              <a:t>tahun</a:t>
-            </a:r>
-            <a:r>
-              <a:rPr lang="en-ID" dirty="0"/>
-              <a:t> </a:t>
-            </a:r>
-            <a:r>
-              <a:rPr lang="en-ID" dirty="0" err="1"/>
-              <a:t>ke</a:t>
-            </a:r>
-            <a:r>
-              <a:rPr lang="en-ID" dirty="0"/>
-              <a:t> </a:t>
-            </a:r>
-            <a:r>
-              <a:rPr lang="en-ID" dirty="0" err="1"/>
-              <a:t>tahun</a:t>
-            </a:r>
-            <a:r>
-              <a:rPr lang="en-ID" dirty="0"/>
-              <a:t> </a:t>
-            </a:r>
-            <a:r>
-              <a:rPr lang="en-ID" dirty="0" err="1"/>
-              <a:t>berhubungan</a:t>
-            </a:r>
-            <a:r>
-              <a:rPr lang="en-ID" dirty="0"/>
-              <a:t> </a:t>
-            </a:r>
-            <a:r>
-              <a:rPr lang="en-ID" dirty="0" err="1"/>
-              <a:t>dengan</a:t>
-            </a:r>
-            <a:r>
-              <a:rPr lang="en-ID" dirty="0"/>
-              <a:t> </a:t>
-            </a:r>
-            <a:r>
-              <a:rPr lang="en-ID" dirty="0" err="1"/>
-              <a:t>harga</a:t>
-            </a:r>
-            <a:r>
-              <a:rPr lang="en-ID" dirty="0"/>
-              <a:t> </a:t>
-            </a:r>
-            <a:r>
-              <a:rPr lang="en-ID" dirty="0" err="1"/>
-              <a:t>saham</a:t>
-            </a:r>
-            <a:r>
-              <a:rPr lang="en-ID" dirty="0"/>
-              <a:t> </a:t>
-            </a:r>
-            <a:r>
-              <a:rPr lang="en-ID" dirty="0" err="1"/>
-              <a:t>harian</a:t>
-            </a:r>
-            <a:r>
-              <a:rPr lang="en-ID" dirty="0"/>
-              <a:t>?</a:t>
-            </a:r>
-          </a:p>
-          <a:p>
-            <a:r>
-              <a:rPr lang="en-ID" dirty="0" err="1"/>
-              <a:t>Bagaimana</a:t>
-            </a:r>
-            <a:r>
-              <a:rPr lang="en-ID" dirty="0"/>
-              <a:t> </a:t>
-            </a:r>
-            <a:r>
-              <a:rPr lang="en-ID" dirty="0" err="1"/>
-              <a:t>perkembangan</a:t>
-            </a:r>
-            <a:r>
-              <a:rPr lang="en-ID" dirty="0"/>
-              <a:t> </a:t>
-            </a:r>
-            <a:r>
-              <a:rPr lang="en-ID" dirty="0" err="1"/>
-              <a:t>pendapatan</a:t>
-            </a:r>
-            <a:r>
-              <a:rPr lang="en-ID" dirty="0"/>
-              <a:t>, </a:t>
-            </a:r>
-            <a:r>
-              <a:rPr lang="en-ID" dirty="0" err="1"/>
-              <a:t>biaya</a:t>
-            </a:r>
-            <a:r>
-              <a:rPr lang="en-ID" dirty="0"/>
-              <a:t>, dan </a:t>
-            </a:r>
-            <a:r>
-              <a:rPr lang="en-ID" dirty="0" err="1"/>
-              <a:t>laba</a:t>
-            </a:r>
-            <a:r>
-              <a:rPr lang="en-ID" dirty="0"/>
-              <a:t> </a:t>
-            </a:r>
-            <a:r>
-              <a:rPr lang="en-ID" dirty="0" err="1"/>
-              <a:t>bersih</a:t>
-            </a:r>
-            <a:r>
-              <a:rPr lang="en-ID" dirty="0"/>
-              <a:t> </a:t>
-            </a:r>
-            <a:r>
-              <a:rPr lang="en-ID" dirty="0" err="1"/>
-              <a:t>perusahaan</a:t>
-            </a:r>
-            <a:r>
-              <a:rPr lang="en-ID" dirty="0"/>
-              <a:t> </a:t>
-            </a:r>
-            <a:r>
-              <a:rPr lang="en-ID" dirty="0" err="1"/>
-              <a:t>dari</a:t>
-            </a:r>
-            <a:r>
-              <a:rPr lang="en-ID" dirty="0"/>
-              <a:t> </a:t>
-            </a:r>
-            <a:r>
-              <a:rPr lang="en-ID" dirty="0" err="1"/>
-              <a:t>tahun</a:t>
-            </a:r>
-            <a:r>
-              <a:rPr lang="en-ID" dirty="0"/>
-              <a:t> </a:t>
-            </a:r>
-            <a:r>
-              <a:rPr lang="en-ID" dirty="0" err="1"/>
-              <a:t>ke</a:t>
-            </a:r>
-            <a:r>
-              <a:rPr lang="en-ID" dirty="0"/>
-              <a:t> </a:t>
-            </a:r>
-            <a:r>
-              <a:rPr lang="en-ID" dirty="0" err="1"/>
-              <a:t>tahun</a:t>
-            </a:r>
-            <a:r>
-              <a:rPr lang="en-ID" dirty="0"/>
-              <a:t> </a:t>
-            </a:r>
-            <a:r>
-              <a:rPr lang="en-ID" dirty="0" err="1"/>
-              <a:t>berhubungan</a:t>
-            </a:r>
-            <a:r>
-              <a:rPr lang="en-ID" dirty="0"/>
-              <a:t> </a:t>
-            </a:r>
-            <a:r>
-              <a:rPr lang="en-ID" dirty="0" err="1"/>
-              <a:t>dengan</a:t>
-            </a:r>
-            <a:r>
-              <a:rPr lang="en-ID" dirty="0"/>
-              <a:t> </a:t>
-            </a:r>
-            <a:r>
-              <a:rPr lang="en-ID" dirty="0" err="1"/>
-              <a:t>kinerja</a:t>
-            </a:r>
-            <a:r>
-              <a:rPr lang="en-ID" dirty="0"/>
-              <a:t> </a:t>
-            </a:r>
-            <a:r>
-              <a:rPr lang="en-ID" dirty="0" err="1"/>
-              <a:t>saham</a:t>
-            </a:r>
-            <a:r>
-              <a:rPr lang="en-ID" dirty="0"/>
-              <a:t> </a:t>
-            </a:r>
-            <a:r>
-              <a:rPr lang="en-ID" dirty="0" err="1"/>
-              <a:t>harian</a:t>
-            </a:r>
-            <a:r>
-              <a:rPr lang="en-ID" dirty="0"/>
-              <a:t>?</a:t>
-            </a:r>
-          </a:p>
-          <a:p>
-            <a:r>
-              <a:rPr lang="en-ID" dirty="0" err="1"/>
-              <a:t>Korelasi</a:t>
-            </a:r>
-            <a:r>
-              <a:rPr lang="en-ID" dirty="0"/>
-              <a:t> </a:t>
-            </a:r>
-            <a:r>
-              <a:rPr lang="en-ID" dirty="0" err="1"/>
-              <a:t>antara</a:t>
-            </a:r>
-            <a:r>
-              <a:rPr lang="en-ID" dirty="0"/>
-              <a:t> </a:t>
-            </a:r>
-            <a:r>
-              <a:rPr lang="en-ID" dirty="0" err="1"/>
-              <a:t>Laporan</a:t>
-            </a:r>
-            <a:r>
-              <a:rPr lang="en-ID" dirty="0"/>
-              <a:t> </a:t>
-            </a:r>
-            <a:r>
-              <a:rPr lang="en-ID" dirty="0" err="1"/>
-              <a:t>Keuangan</a:t>
-            </a:r>
-            <a:r>
-              <a:rPr lang="en-ID" dirty="0"/>
-              <a:t> dan Kinerja Saham</a:t>
-            </a:r>
-          </a:p>
-          <a:p>
-            <a:endParaRPr lang="en-ID" dirty="0"/>
-          </a:p>
-          <a:p>
-            <a:r>
-              <a:rPr lang="en-ID" dirty="0" err="1"/>
-              <a:t>Bagaimana</a:t>
-            </a:r>
-            <a:r>
-              <a:rPr lang="en-ID" dirty="0"/>
-              <a:t> </a:t>
-            </a:r>
-            <a:r>
-              <a:rPr lang="en-ID" dirty="0" err="1"/>
-              <a:t>rasio</a:t>
-            </a:r>
-            <a:r>
-              <a:rPr lang="en-ID" dirty="0"/>
-              <a:t> </a:t>
-            </a:r>
-            <a:r>
-              <a:rPr lang="en-ID" dirty="0" err="1"/>
-              <a:t>keuangan</a:t>
-            </a:r>
-            <a:r>
-              <a:rPr lang="en-ID" dirty="0"/>
-              <a:t> </a:t>
-            </a:r>
-            <a:r>
-              <a:rPr lang="en-ID" dirty="0" err="1"/>
-              <a:t>seperti</a:t>
-            </a:r>
-            <a:r>
-              <a:rPr lang="en-ID" dirty="0"/>
-              <a:t> current ratio, debt to equity ratio, dan net profit margin </a:t>
-            </a:r>
-            <a:r>
-              <a:rPr lang="en-ID" dirty="0" err="1"/>
-              <a:t>berhubungan</a:t>
-            </a:r>
-            <a:r>
-              <a:rPr lang="en-ID" dirty="0"/>
-              <a:t> </a:t>
-            </a:r>
-            <a:r>
-              <a:rPr lang="en-ID" dirty="0" err="1"/>
-              <a:t>dengan</a:t>
-            </a:r>
-            <a:r>
-              <a:rPr lang="en-ID" dirty="0"/>
-              <a:t> </a:t>
-            </a:r>
-            <a:r>
-              <a:rPr lang="en-ID" dirty="0" err="1"/>
-              <a:t>harga</a:t>
-            </a:r>
-            <a:r>
-              <a:rPr lang="en-ID" dirty="0"/>
-              <a:t> </a:t>
-            </a:r>
-            <a:r>
-              <a:rPr lang="en-ID" dirty="0" err="1"/>
-              <a:t>saham</a:t>
-            </a:r>
-            <a:r>
-              <a:rPr lang="en-ID" dirty="0"/>
-              <a:t> dan volume </a:t>
-            </a:r>
-            <a:r>
-              <a:rPr lang="en-ID" dirty="0" err="1"/>
-              <a:t>perdagangan</a:t>
-            </a:r>
-            <a:r>
-              <a:rPr lang="en-ID" dirty="0"/>
-              <a:t>?</a:t>
-            </a:r>
-          </a:p>
-          <a:p>
-            <a:r>
-              <a:rPr lang="en-ID" dirty="0" err="1"/>
-              <a:t>Apakah</a:t>
-            </a:r>
-            <a:r>
-              <a:rPr lang="en-ID" dirty="0"/>
-              <a:t> </a:t>
-            </a:r>
-            <a:r>
-              <a:rPr lang="en-ID" dirty="0" err="1"/>
-              <a:t>ada</a:t>
-            </a:r>
-            <a:r>
-              <a:rPr lang="en-ID" dirty="0"/>
-              <a:t> </a:t>
-            </a:r>
-            <a:r>
-              <a:rPr lang="en-ID" dirty="0" err="1"/>
-              <a:t>pola</a:t>
-            </a:r>
-            <a:r>
-              <a:rPr lang="en-ID" dirty="0"/>
-              <a:t> yang </a:t>
-            </a:r>
-            <a:r>
-              <a:rPr lang="en-ID" dirty="0" err="1"/>
-              <a:t>jelas</a:t>
-            </a:r>
-            <a:r>
-              <a:rPr lang="en-ID" dirty="0"/>
-              <a:t> </a:t>
-            </a:r>
-            <a:r>
-              <a:rPr lang="en-ID" dirty="0" err="1"/>
-              <a:t>antara</a:t>
-            </a:r>
-            <a:r>
-              <a:rPr lang="en-ID" dirty="0"/>
-              <a:t> </a:t>
-            </a:r>
-            <a:r>
-              <a:rPr lang="en-ID" dirty="0" err="1"/>
-              <a:t>perubahan</a:t>
-            </a:r>
-            <a:r>
-              <a:rPr lang="en-ID" dirty="0"/>
-              <a:t> </a:t>
-            </a:r>
-            <a:r>
-              <a:rPr lang="en-ID" dirty="0" err="1"/>
-              <a:t>harga</a:t>
-            </a:r>
-            <a:r>
-              <a:rPr lang="en-ID" dirty="0"/>
-              <a:t> </a:t>
-            </a:r>
-            <a:r>
-              <a:rPr lang="en-ID" dirty="0" err="1"/>
-              <a:t>saham</a:t>
-            </a:r>
-            <a:r>
-              <a:rPr lang="en-ID" dirty="0"/>
-              <a:t> </a:t>
-            </a:r>
-            <a:r>
-              <a:rPr lang="en-ID" dirty="0" err="1"/>
-              <a:t>harian</a:t>
-            </a:r>
-            <a:r>
-              <a:rPr lang="en-ID" dirty="0"/>
-              <a:t> dan </a:t>
-            </a:r>
-            <a:r>
-              <a:rPr lang="en-ID" dirty="0" err="1"/>
-              <a:t>metrik</a:t>
-            </a:r>
-            <a:r>
-              <a:rPr lang="en-ID" dirty="0"/>
-              <a:t> </a:t>
-            </a:r>
-            <a:r>
-              <a:rPr lang="en-ID" dirty="0" err="1"/>
-              <a:t>keuangan</a:t>
-            </a:r>
-            <a:r>
-              <a:rPr lang="en-ID" dirty="0"/>
-              <a:t> </a:t>
-            </a:r>
-            <a:r>
-              <a:rPr lang="en-ID" dirty="0" err="1"/>
-              <a:t>tahunan</a:t>
-            </a:r>
-            <a:r>
-              <a:rPr lang="en-ID" dirty="0"/>
-              <a:t>?</a:t>
-            </a:r>
-          </a:p>
-          <a:p>
-            <a:r>
-              <a:rPr lang="en-ID" dirty="0" err="1"/>
-              <a:t>Analisis</a:t>
-            </a:r>
-            <a:r>
-              <a:rPr lang="en-ID" dirty="0"/>
-              <a:t> </a:t>
-            </a:r>
-            <a:r>
-              <a:rPr lang="en-ID" dirty="0" err="1"/>
-              <a:t>Volatilitas</a:t>
-            </a:r>
-            <a:r>
-              <a:rPr lang="en-ID" dirty="0"/>
-              <a:t> Saham dan </a:t>
-            </a:r>
-            <a:r>
-              <a:rPr lang="en-ID" dirty="0" err="1"/>
-              <a:t>Faktor</a:t>
-            </a:r>
-            <a:r>
-              <a:rPr lang="en-ID" dirty="0"/>
-              <a:t> </a:t>
-            </a:r>
-            <a:r>
-              <a:rPr lang="en-ID" dirty="0" err="1"/>
-              <a:t>Keuangan</a:t>
-            </a:r>
-            <a:endParaRPr lang="en-ID" dirty="0"/>
-          </a:p>
-          <a:p>
-            <a:endParaRPr lang="en-ID" dirty="0"/>
-          </a:p>
-          <a:p>
-            <a:r>
-              <a:rPr lang="en-ID" dirty="0" err="1"/>
-              <a:t>Bagaimana</a:t>
-            </a:r>
-            <a:r>
-              <a:rPr lang="en-ID" dirty="0"/>
-              <a:t> </a:t>
-            </a:r>
-            <a:r>
-              <a:rPr lang="en-ID" dirty="0" err="1"/>
-              <a:t>volatilitas</a:t>
-            </a:r>
-            <a:r>
-              <a:rPr lang="en-ID" dirty="0"/>
-              <a:t> </a:t>
-            </a:r>
-            <a:r>
-              <a:rPr lang="en-ID" dirty="0" err="1"/>
-              <a:t>harga</a:t>
-            </a:r>
-            <a:r>
-              <a:rPr lang="en-ID" dirty="0"/>
-              <a:t> </a:t>
-            </a:r>
-            <a:r>
-              <a:rPr lang="en-ID" dirty="0" err="1"/>
-              <a:t>saham</a:t>
-            </a:r>
-            <a:r>
-              <a:rPr lang="en-ID" dirty="0"/>
-              <a:t> </a:t>
-            </a:r>
-            <a:r>
-              <a:rPr lang="en-ID" dirty="0" err="1"/>
-              <a:t>harian</a:t>
-            </a:r>
-            <a:r>
-              <a:rPr lang="en-ID" dirty="0"/>
-              <a:t> </a:t>
-            </a:r>
-            <a:r>
-              <a:rPr lang="en-ID" dirty="0" err="1"/>
-              <a:t>berhubungan</a:t>
-            </a:r>
-            <a:r>
-              <a:rPr lang="en-ID" dirty="0"/>
-              <a:t> </a:t>
-            </a:r>
-            <a:r>
-              <a:rPr lang="en-ID" dirty="0" err="1"/>
-              <a:t>dengan</a:t>
-            </a:r>
-            <a:r>
-              <a:rPr lang="en-ID" dirty="0"/>
-              <a:t> </a:t>
-            </a:r>
-            <a:r>
-              <a:rPr lang="en-ID" dirty="0" err="1"/>
-              <a:t>perubahan</a:t>
-            </a:r>
-            <a:r>
-              <a:rPr lang="en-ID" dirty="0"/>
-              <a:t> </a:t>
-            </a:r>
-            <a:r>
-              <a:rPr lang="en-ID" dirty="0" err="1"/>
-              <a:t>dalam</a:t>
-            </a:r>
-            <a:r>
-              <a:rPr lang="en-ID" dirty="0"/>
-              <a:t> </a:t>
-            </a:r>
-            <a:r>
-              <a:rPr lang="en-ID" dirty="0" err="1"/>
-              <a:t>laporan</a:t>
-            </a:r>
-            <a:r>
-              <a:rPr lang="en-ID" dirty="0"/>
-              <a:t> </a:t>
-            </a:r>
-            <a:r>
-              <a:rPr lang="en-ID" dirty="0" err="1"/>
-              <a:t>keuangan</a:t>
-            </a:r>
-            <a:r>
-              <a:rPr lang="en-ID" dirty="0"/>
-              <a:t> </a:t>
-            </a:r>
-            <a:r>
-              <a:rPr lang="en-ID" dirty="0" err="1"/>
-              <a:t>tahunan</a:t>
-            </a:r>
-            <a:r>
-              <a:rPr lang="en-ID" dirty="0"/>
-              <a:t>?</a:t>
-            </a:r>
-          </a:p>
-          <a:p>
-            <a:r>
-              <a:rPr lang="en-ID" dirty="0" err="1"/>
-              <a:t>Apakah</a:t>
-            </a:r>
-            <a:r>
-              <a:rPr lang="en-ID" dirty="0"/>
-              <a:t> </a:t>
-            </a:r>
-            <a:r>
-              <a:rPr lang="en-ID" dirty="0" err="1"/>
-              <a:t>laporan</a:t>
-            </a:r>
-            <a:r>
-              <a:rPr lang="en-ID" dirty="0"/>
-              <a:t> </a:t>
-            </a:r>
-            <a:r>
-              <a:rPr lang="en-ID" dirty="0" err="1"/>
-              <a:t>keuangan</a:t>
-            </a:r>
-            <a:r>
-              <a:rPr lang="en-ID" dirty="0"/>
-              <a:t> </a:t>
-            </a:r>
-            <a:r>
-              <a:rPr lang="en-ID" dirty="0" err="1"/>
-              <a:t>tertentu</a:t>
-            </a:r>
-            <a:r>
-              <a:rPr lang="en-ID" dirty="0"/>
-              <a:t> </a:t>
-            </a:r>
-            <a:r>
-              <a:rPr lang="en-ID" dirty="0" err="1"/>
-              <a:t>seperti</a:t>
-            </a:r>
-            <a:r>
-              <a:rPr lang="en-ID" dirty="0"/>
-              <a:t> </a:t>
-            </a:r>
-            <a:r>
-              <a:rPr lang="en-ID" dirty="0" err="1"/>
-              <a:t>laba</a:t>
-            </a:r>
-            <a:r>
-              <a:rPr lang="en-ID" dirty="0"/>
-              <a:t> </a:t>
-            </a:r>
-            <a:r>
-              <a:rPr lang="en-ID" dirty="0" err="1"/>
-              <a:t>bersih</a:t>
-            </a:r>
-            <a:r>
-              <a:rPr lang="en-ID" dirty="0"/>
-              <a:t> </a:t>
-            </a:r>
-            <a:r>
-              <a:rPr lang="en-ID" dirty="0" err="1"/>
-              <a:t>atau</a:t>
-            </a:r>
-            <a:r>
-              <a:rPr lang="en-ID" dirty="0"/>
-              <a:t> total </a:t>
-            </a:r>
-            <a:r>
-              <a:rPr lang="en-ID" dirty="0" err="1"/>
-              <a:t>aset</a:t>
-            </a:r>
-            <a:r>
-              <a:rPr lang="en-ID" dirty="0"/>
-              <a:t> </a:t>
-            </a:r>
-            <a:r>
-              <a:rPr lang="en-ID" dirty="0" err="1"/>
-              <a:t>mempengaruhi</a:t>
-            </a:r>
-            <a:r>
-              <a:rPr lang="en-ID" dirty="0"/>
-              <a:t> </a:t>
-            </a:r>
-            <a:r>
-              <a:rPr lang="en-ID" dirty="0" err="1"/>
-              <a:t>volatilitas</a:t>
-            </a:r>
-            <a:r>
-              <a:rPr lang="en-ID" dirty="0"/>
-              <a:t> </a:t>
-            </a:r>
-            <a:r>
-              <a:rPr lang="en-ID" dirty="0" err="1"/>
-              <a:t>saham</a:t>
-            </a:r>
-            <a:r>
-              <a:rPr lang="en-ID" dirty="0"/>
-              <a:t>?</a:t>
-            </a:r>
-          </a:p>
-          <a:p>
-            <a:r>
-              <a:rPr lang="en-ID" dirty="0" err="1"/>
-              <a:t>Perbandingan</a:t>
-            </a:r>
-            <a:r>
-              <a:rPr lang="en-ID" dirty="0"/>
-              <a:t> Kinerja </a:t>
-            </a:r>
-            <a:r>
-              <a:rPr lang="en-ID" dirty="0" err="1"/>
-              <a:t>Antar</a:t>
-            </a:r>
-            <a:r>
-              <a:rPr lang="en-ID" dirty="0"/>
-              <a:t> Perusahaan</a:t>
-            </a:r>
-          </a:p>
-          <a:p>
-            <a:endParaRPr lang="en-ID" dirty="0"/>
-          </a:p>
-          <a:p>
-            <a:r>
-              <a:rPr lang="en-ID" dirty="0" err="1"/>
-              <a:t>Bagaimana</a:t>
-            </a:r>
-            <a:r>
-              <a:rPr lang="en-ID" dirty="0"/>
-              <a:t> </a:t>
-            </a:r>
-            <a:r>
-              <a:rPr lang="en-ID" dirty="0" err="1"/>
-              <a:t>kinerja</a:t>
-            </a:r>
-            <a:r>
-              <a:rPr lang="en-ID" dirty="0"/>
-              <a:t> </a:t>
-            </a:r>
-            <a:r>
-              <a:rPr lang="en-ID" dirty="0" err="1"/>
-              <a:t>keuangan</a:t>
-            </a:r>
-            <a:r>
-              <a:rPr lang="en-ID" dirty="0"/>
-              <a:t> dan </a:t>
-            </a:r>
-            <a:r>
-              <a:rPr lang="en-ID" dirty="0" err="1"/>
-              <a:t>saham</a:t>
-            </a:r>
-            <a:r>
-              <a:rPr lang="en-ID" dirty="0"/>
-              <a:t> </a:t>
-            </a:r>
-            <a:r>
-              <a:rPr lang="en-ID" dirty="0" err="1"/>
-              <a:t>dari</a:t>
-            </a:r>
-            <a:r>
-              <a:rPr lang="en-ID" dirty="0"/>
-              <a:t> </a:t>
-            </a:r>
-            <a:r>
-              <a:rPr lang="en-ID" dirty="0" err="1"/>
-              <a:t>beberapa</a:t>
-            </a:r>
-            <a:r>
-              <a:rPr lang="en-ID" dirty="0"/>
-              <a:t> </a:t>
-            </a:r>
-            <a:r>
-              <a:rPr lang="en-ID" dirty="0" err="1"/>
-              <a:t>perusahaan</a:t>
-            </a:r>
-            <a:r>
-              <a:rPr lang="en-ID" dirty="0"/>
-              <a:t> </a:t>
-            </a:r>
-            <a:r>
-              <a:rPr lang="en-ID" dirty="0" err="1"/>
-              <a:t>dalam</a:t>
-            </a:r>
-            <a:r>
-              <a:rPr lang="en-ID" dirty="0"/>
-              <a:t> </a:t>
-            </a:r>
-            <a:r>
-              <a:rPr lang="en-ID" dirty="0" err="1"/>
-              <a:t>industri</a:t>
-            </a:r>
-            <a:r>
-              <a:rPr lang="en-ID" dirty="0"/>
-              <a:t> yang </a:t>
-            </a:r>
-            <a:r>
-              <a:rPr lang="en-ID" dirty="0" err="1"/>
-              <a:t>sama</a:t>
-            </a:r>
-            <a:r>
-              <a:rPr lang="en-ID" dirty="0"/>
-              <a:t>?</a:t>
-            </a:r>
-          </a:p>
-          <a:p>
-            <a:r>
-              <a:rPr lang="en-ID" dirty="0"/>
-              <a:t>Perusahaan mana yang </a:t>
-            </a:r>
-            <a:r>
-              <a:rPr lang="en-ID" dirty="0" err="1"/>
-              <a:t>memiliki</a:t>
-            </a:r>
-            <a:r>
-              <a:rPr lang="en-ID" dirty="0"/>
-              <a:t> </a:t>
-            </a:r>
-            <a:r>
-              <a:rPr lang="en-ID" dirty="0" err="1"/>
-              <a:t>kinerja</a:t>
-            </a:r>
-            <a:r>
-              <a:rPr lang="en-ID" dirty="0"/>
-              <a:t> </a:t>
-            </a:r>
-            <a:r>
-              <a:rPr lang="en-ID" dirty="0" err="1"/>
-              <a:t>terbaik</a:t>
-            </a:r>
-            <a:r>
-              <a:rPr lang="en-ID" dirty="0"/>
-              <a:t> </a:t>
-            </a:r>
-            <a:r>
-              <a:rPr lang="en-ID" dirty="0" err="1"/>
-              <a:t>dalam</a:t>
-            </a:r>
-            <a:r>
-              <a:rPr lang="en-ID" dirty="0"/>
-              <a:t> </a:t>
-            </a:r>
-            <a:r>
-              <a:rPr lang="en-ID" dirty="0" err="1"/>
-              <a:t>hal</a:t>
-            </a:r>
-            <a:r>
-              <a:rPr lang="en-ID" dirty="0"/>
-              <a:t> </a:t>
-            </a:r>
-            <a:r>
-              <a:rPr lang="en-ID" dirty="0" err="1"/>
-              <a:t>laba</a:t>
-            </a:r>
-            <a:r>
-              <a:rPr lang="en-ID" dirty="0"/>
-              <a:t> </a:t>
-            </a:r>
-            <a:r>
-              <a:rPr lang="en-ID" dirty="0" err="1"/>
-              <a:t>bersih</a:t>
-            </a:r>
-            <a:r>
-              <a:rPr lang="en-ID" dirty="0"/>
-              <a:t>, total </a:t>
-            </a:r>
-            <a:r>
-              <a:rPr lang="en-ID" dirty="0" err="1"/>
-              <a:t>aset</a:t>
-            </a:r>
-            <a:r>
-              <a:rPr lang="en-ID" dirty="0"/>
-              <a:t>, </a:t>
-            </a:r>
-            <a:r>
-              <a:rPr lang="en-ID" dirty="0" err="1"/>
-              <a:t>atau</a:t>
-            </a:r>
-            <a:r>
-              <a:rPr lang="en-ID" dirty="0"/>
-              <a:t> </a:t>
-            </a:r>
-            <a:r>
-              <a:rPr lang="en-ID" dirty="0" err="1"/>
-              <a:t>pertumbuhan</a:t>
-            </a:r>
-            <a:r>
-              <a:rPr lang="en-ID" dirty="0"/>
-              <a:t> </a:t>
-            </a:r>
-            <a:r>
-              <a:rPr lang="en-ID" dirty="0" err="1"/>
-              <a:t>harga</a:t>
-            </a:r>
-            <a:r>
-              <a:rPr lang="en-ID" dirty="0"/>
-              <a:t> </a:t>
-            </a:r>
-            <a:r>
-              <a:rPr lang="en-ID" dirty="0" err="1"/>
-              <a:t>saham</a:t>
-            </a:r>
-            <a:r>
-              <a:rPr lang="en-ID" dirty="0"/>
-              <a:t>?</a:t>
+              <a:rPr lang="en-US" dirty="0"/>
+              <a:t>Question: Which companies have the highest total assets in the balance sheet?</a:t>
+            </a:r>
+          </a:p>
+          <a:p>
+            <a:r>
+              <a:rPr lang="en-US" dirty="0"/>
+              <a:t>Question: List the top 5 companies that had the highest net income margin percentage in the latest available year</a:t>
+            </a:r>
+          </a:p>
+          <a:p>
+            <a:r>
+              <a:rPr lang="en-US" b="0" dirty="0">
+                <a:effectLst/>
+                <a:highlight>
+                  <a:srgbClr val="FFFFFF"/>
+                </a:highlight>
+                <a:latin typeface="Roboto Mono" panose="020F0502020204030204" pitchFamily="49" charset="0"/>
+              </a:rPr>
+              <a:t>List the companies with bad debt ratio (</a:t>
+            </a:r>
+            <a:r>
+              <a:rPr lang="en-US" b="0" dirty="0" err="1">
+                <a:effectLst/>
+                <a:highlight>
+                  <a:srgbClr val="FFFFFF"/>
+                </a:highlight>
+                <a:latin typeface="Roboto Mono" panose="020F0502020204030204" pitchFamily="49" charset="0"/>
+              </a:rPr>
+              <a:t>liabilites</a:t>
+            </a:r>
+            <a:r>
+              <a:rPr lang="en-US" b="0" dirty="0">
+                <a:effectLst/>
+                <a:highlight>
+                  <a:srgbClr val="FFFFFF"/>
+                </a:highlight>
+                <a:latin typeface="Roboto Mono" panose="020F0502020204030204" pitchFamily="49" charset="0"/>
+              </a:rPr>
+              <a:t> to asset &gt;60%) on 2023</a:t>
+            </a:r>
+            <a:endParaRPr lang="en-US" dirty="0"/>
+          </a:p>
+          <a:p>
+            <a:r>
+              <a:rPr lang="en-US" dirty="0"/>
+              <a:t>Question: List the average PE ratio and dividend yield for companies in each sector.</a:t>
+            </a:r>
+          </a:p>
+          <a:p>
+            <a:r>
+              <a:rPr lang="en-US" dirty="0"/>
+              <a:t>Question: List companies with the highest net income growth rate in the last two years.</a:t>
             </a:r>
           </a:p>
         </p:txBody>
@@ -5576,6 +3801,478 @@
     <p:extLst>
       <p:ext uri="{BB962C8B-B14F-4D97-AF65-F5344CB8AC3E}">
         <p14:creationId xmlns:p14="http://schemas.microsoft.com/office/powerpoint/2010/main" val="2903160726"/>
+      </p:ext>
+    </p:extLst>
+  </p:cSld>
+  <p:clrMapOvr>
+    <a:masterClrMapping/>
+  </p:clrMapOvr>
+</p:sld>
+</file>
+
+<file path=ppt/slides/slide5.xml><?xml version="1.0" encoding="utf-8"?>
+<p:sld xmlns:a="http://schemas.openxmlformats.org/drawingml/2006/main" xmlns:r="http://schemas.openxmlformats.org/officeDocument/2006/relationships" xmlns:p="http://schemas.openxmlformats.org/presentationml/2006/main">
+  <p:cSld>
+    <p:spTree>
+      <p:nvGrpSpPr>
+        <p:cNvPr id="1" name=""/>
+        <p:cNvGrpSpPr/>
+        <p:nvPr/>
+      </p:nvGrpSpPr>
+      <p:grpSpPr>
+        <a:xfrm>
+          <a:off x="0" y="0"/>
+          <a:ext cx="0" cy="0"/>
+          <a:chOff x="0" y="0"/>
+          <a:chExt cx="0" cy="0"/>
+        </a:xfrm>
+      </p:grpSpPr>
+      <p:sp>
+        <p:nvSpPr>
+          <p:cNvPr id="2" name="Title 1">
+            <a:extLst>
+              <a:ext uri="{FF2B5EF4-FFF2-40B4-BE49-F238E27FC236}">
+                <a16:creationId xmlns:a16="http://schemas.microsoft.com/office/drawing/2014/main" id="{13CF5B6E-13CF-3774-41C9-3EB2E1C6DBCD}"/>
+              </a:ext>
+            </a:extLst>
+          </p:cNvPr>
+          <p:cNvSpPr>
+            <a:spLocks noGrp="1"/>
+          </p:cNvSpPr>
+          <p:nvPr>
+            <p:ph type="title"/>
+          </p:nvPr>
+        </p:nvSpPr>
+        <p:spPr/>
+        <p:txBody>
+          <a:bodyPr/>
+          <a:lstStyle/>
+          <a:p>
+            <a:endParaRPr lang="en-ID"/>
+          </a:p>
+        </p:txBody>
+      </p:sp>
+      <p:sp>
+        <p:nvSpPr>
+          <p:cNvPr id="3" name="Content Placeholder 2">
+            <a:extLst>
+              <a:ext uri="{FF2B5EF4-FFF2-40B4-BE49-F238E27FC236}">
+                <a16:creationId xmlns:a16="http://schemas.microsoft.com/office/drawing/2014/main" id="{ED2FC4FB-D14E-F421-AFA1-7321EA694BD1}"/>
+              </a:ext>
+            </a:extLst>
+          </p:cNvPr>
+          <p:cNvSpPr>
+            <a:spLocks noGrp="1"/>
+          </p:cNvSpPr>
+          <p:nvPr>
+            <p:ph idx="1"/>
+          </p:nvPr>
+        </p:nvSpPr>
+        <p:spPr/>
+        <p:txBody>
+          <a:bodyPr/>
+          <a:lstStyle/>
+          <a:p>
+            <a:endParaRPr lang="en-ID"/>
+          </a:p>
+        </p:txBody>
+      </p:sp>
+      <p:pic>
+        <p:nvPicPr>
+          <p:cNvPr id="5" name="Picture 4">
+            <a:extLst>
+              <a:ext uri="{FF2B5EF4-FFF2-40B4-BE49-F238E27FC236}">
+                <a16:creationId xmlns:a16="http://schemas.microsoft.com/office/drawing/2014/main" id="{C1CBA2F8-C049-9A0C-CA2B-3EF2CCA67ADC}"/>
+              </a:ext>
+            </a:extLst>
+          </p:cNvPr>
+          <p:cNvPicPr>
+            <a:picLocks noChangeAspect="1"/>
+          </p:cNvPicPr>
+          <p:nvPr/>
+        </p:nvPicPr>
+        <p:blipFill>
+          <a:blip r:embed="rId2"/>
+          <a:stretch>
+            <a:fillRect/>
+          </a:stretch>
+        </p:blipFill>
+        <p:spPr>
+          <a:xfrm>
+            <a:off x="2021542" y="2308960"/>
+            <a:ext cx="6228229" cy="3384667"/>
+          </a:xfrm>
+          <a:prstGeom prst="rect">
+            <a:avLst/>
+          </a:prstGeom>
+        </p:spPr>
+      </p:pic>
+    </p:spTree>
+    <p:extLst>
+      <p:ext uri="{BB962C8B-B14F-4D97-AF65-F5344CB8AC3E}">
+        <p14:creationId xmlns:p14="http://schemas.microsoft.com/office/powerpoint/2010/main" val="2064014636"/>
+      </p:ext>
+    </p:extLst>
+  </p:cSld>
+  <p:clrMapOvr>
+    <a:masterClrMapping/>
+  </p:clrMapOvr>
+</p:sld>
+</file>
+
+<file path=ppt/slides/slide6.xml><?xml version="1.0" encoding="utf-8"?>
+<p:sld xmlns:a="http://schemas.openxmlformats.org/drawingml/2006/main" xmlns:r="http://schemas.openxmlformats.org/officeDocument/2006/relationships" xmlns:p="http://schemas.openxmlformats.org/presentationml/2006/main">
+  <p:cSld>
+    <p:spTree>
+      <p:nvGrpSpPr>
+        <p:cNvPr id="1" name=""/>
+        <p:cNvGrpSpPr/>
+        <p:nvPr/>
+      </p:nvGrpSpPr>
+      <p:grpSpPr>
+        <a:xfrm>
+          <a:off x="0" y="0"/>
+          <a:ext cx="0" cy="0"/>
+          <a:chOff x="0" y="0"/>
+          <a:chExt cx="0" cy="0"/>
+        </a:xfrm>
+      </p:grpSpPr>
+      <p:sp>
+        <p:nvSpPr>
+          <p:cNvPr id="2" name="Title 1">
+            <a:extLst>
+              <a:ext uri="{FF2B5EF4-FFF2-40B4-BE49-F238E27FC236}">
+                <a16:creationId xmlns:a16="http://schemas.microsoft.com/office/drawing/2014/main" id="{CD1CAFF5-B304-EEED-EB67-63E2F50C6E93}"/>
+              </a:ext>
+            </a:extLst>
+          </p:cNvPr>
+          <p:cNvSpPr>
+            <a:spLocks noGrp="1"/>
+          </p:cNvSpPr>
+          <p:nvPr>
+            <p:ph type="title"/>
+          </p:nvPr>
+        </p:nvSpPr>
+        <p:spPr/>
+        <p:txBody>
+          <a:bodyPr/>
+          <a:lstStyle/>
+          <a:p>
+            <a:endParaRPr lang="en-ID"/>
+          </a:p>
+        </p:txBody>
+      </p:sp>
+      <p:sp>
+        <p:nvSpPr>
+          <p:cNvPr id="3" name="Content Placeholder 2">
+            <a:extLst>
+              <a:ext uri="{FF2B5EF4-FFF2-40B4-BE49-F238E27FC236}">
+                <a16:creationId xmlns:a16="http://schemas.microsoft.com/office/drawing/2014/main" id="{B5FEFAB9-897B-0734-24B6-52C9CF7AFEBD}"/>
+              </a:ext>
+            </a:extLst>
+          </p:cNvPr>
+          <p:cNvSpPr>
+            <a:spLocks noGrp="1"/>
+          </p:cNvSpPr>
+          <p:nvPr>
+            <p:ph idx="1"/>
+          </p:nvPr>
+        </p:nvSpPr>
+        <p:spPr/>
+        <p:txBody>
+          <a:bodyPr/>
+          <a:lstStyle/>
+          <a:p>
+            <a:endParaRPr lang="en-ID" dirty="0"/>
+          </a:p>
+        </p:txBody>
+      </p:sp>
+      <p:pic>
+        <p:nvPicPr>
+          <p:cNvPr id="5" name="Picture 4">
+            <a:extLst>
+              <a:ext uri="{FF2B5EF4-FFF2-40B4-BE49-F238E27FC236}">
+                <a16:creationId xmlns:a16="http://schemas.microsoft.com/office/drawing/2014/main" id="{B6EECB8C-0F78-076E-DA67-0A684544D62E}"/>
+              </a:ext>
+            </a:extLst>
+          </p:cNvPr>
+          <p:cNvPicPr>
+            <a:picLocks noChangeAspect="1"/>
+          </p:cNvPicPr>
+          <p:nvPr/>
+        </p:nvPicPr>
+        <p:blipFill>
+          <a:blip r:embed="rId2"/>
+          <a:stretch>
+            <a:fillRect/>
+          </a:stretch>
+        </p:blipFill>
+        <p:spPr>
+          <a:xfrm>
+            <a:off x="1409506" y="2854875"/>
+            <a:ext cx="8477250" cy="2466975"/>
+          </a:xfrm>
+          <a:prstGeom prst="rect">
+            <a:avLst/>
+          </a:prstGeom>
+        </p:spPr>
+      </p:pic>
+    </p:spTree>
+    <p:extLst>
+      <p:ext uri="{BB962C8B-B14F-4D97-AF65-F5344CB8AC3E}">
+        <p14:creationId xmlns:p14="http://schemas.microsoft.com/office/powerpoint/2010/main" val="1444722658"/>
+      </p:ext>
+    </p:extLst>
+  </p:cSld>
+  <p:clrMapOvr>
+    <a:masterClrMapping/>
+  </p:clrMapOvr>
+</p:sld>
+</file>
+
+<file path=ppt/slides/slide7.xml><?xml version="1.0" encoding="utf-8"?>
+<p:sld xmlns:a="http://schemas.openxmlformats.org/drawingml/2006/main" xmlns:r="http://schemas.openxmlformats.org/officeDocument/2006/relationships" xmlns:p="http://schemas.openxmlformats.org/presentationml/2006/main">
+  <p:cSld>
+    <p:spTree>
+      <p:nvGrpSpPr>
+        <p:cNvPr id="1" name=""/>
+        <p:cNvGrpSpPr/>
+        <p:nvPr/>
+      </p:nvGrpSpPr>
+      <p:grpSpPr>
+        <a:xfrm>
+          <a:off x="0" y="0"/>
+          <a:ext cx="0" cy="0"/>
+          <a:chOff x="0" y="0"/>
+          <a:chExt cx="0" cy="0"/>
+        </a:xfrm>
+      </p:grpSpPr>
+      <p:sp>
+        <p:nvSpPr>
+          <p:cNvPr id="2" name="Title 1">
+            <a:extLst>
+              <a:ext uri="{FF2B5EF4-FFF2-40B4-BE49-F238E27FC236}">
+                <a16:creationId xmlns:a16="http://schemas.microsoft.com/office/drawing/2014/main" id="{FAE1CB6B-40BC-DC15-168F-582CD91B3533}"/>
+              </a:ext>
+            </a:extLst>
+          </p:cNvPr>
+          <p:cNvSpPr>
+            <a:spLocks noGrp="1"/>
+          </p:cNvSpPr>
+          <p:nvPr>
+            <p:ph type="title"/>
+          </p:nvPr>
+        </p:nvSpPr>
+        <p:spPr/>
+        <p:txBody>
+          <a:bodyPr/>
+          <a:lstStyle/>
+          <a:p>
+            <a:endParaRPr lang="en-ID"/>
+          </a:p>
+        </p:txBody>
+      </p:sp>
+      <p:pic>
+        <p:nvPicPr>
+          <p:cNvPr id="5" name="Content Placeholder 4">
+            <a:extLst>
+              <a:ext uri="{FF2B5EF4-FFF2-40B4-BE49-F238E27FC236}">
+                <a16:creationId xmlns:a16="http://schemas.microsoft.com/office/drawing/2014/main" id="{FE08FA8F-3F8E-AB91-50C8-61CDD37242DE}"/>
+              </a:ext>
+            </a:extLst>
+          </p:cNvPr>
+          <p:cNvPicPr>
+            <a:picLocks noGrp="1" noChangeAspect="1"/>
+          </p:cNvPicPr>
+          <p:nvPr>
+            <p:ph idx="1"/>
+          </p:nvPr>
+        </p:nvPicPr>
+        <p:blipFill>
+          <a:blip r:embed="rId2"/>
+          <a:stretch>
+            <a:fillRect/>
+          </a:stretch>
+        </p:blipFill>
+        <p:spPr>
+          <a:xfrm>
+            <a:off x="3319462" y="1948656"/>
+            <a:ext cx="5553075" cy="4105275"/>
+          </a:xfrm>
+        </p:spPr>
+      </p:pic>
+    </p:spTree>
+    <p:extLst>
+      <p:ext uri="{BB962C8B-B14F-4D97-AF65-F5344CB8AC3E}">
+        <p14:creationId xmlns:p14="http://schemas.microsoft.com/office/powerpoint/2010/main" val="1642454626"/>
+      </p:ext>
+    </p:extLst>
+  </p:cSld>
+  <p:clrMapOvr>
+    <a:masterClrMapping/>
+  </p:clrMapOvr>
+</p:sld>
+</file>
+
+<file path=ppt/slides/slide8.xml><?xml version="1.0" encoding="utf-8"?>
+<p:sld xmlns:a="http://schemas.openxmlformats.org/drawingml/2006/main" xmlns:r="http://schemas.openxmlformats.org/officeDocument/2006/relationships" xmlns:p="http://schemas.openxmlformats.org/presentationml/2006/main">
+  <p:cSld>
+    <p:spTree>
+      <p:nvGrpSpPr>
+        <p:cNvPr id="1" name=""/>
+        <p:cNvGrpSpPr/>
+        <p:nvPr/>
+      </p:nvGrpSpPr>
+      <p:grpSpPr>
+        <a:xfrm>
+          <a:off x="0" y="0"/>
+          <a:ext cx="0" cy="0"/>
+          <a:chOff x="0" y="0"/>
+          <a:chExt cx="0" cy="0"/>
+        </a:xfrm>
+      </p:grpSpPr>
+      <p:sp>
+        <p:nvSpPr>
+          <p:cNvPr id="2" name="Title 1">
+            <a:extLst>
+              <a:ext uri="{FF2B5EF4-FFF2-40B4-BE49-F238E27FC236}">
+                <a16:creationId xmlns:a16="http://schemas.microsoft.com/office/drawing/2014/main" id="{54E052A7-9FC0-D8E4-B20A-D43BC100DF23}"/>
+              </a:ext>
+            </a:extLst>
+          </p:cNvPr>
+          <p:cNvSpPr>
+            <a:spLocks noGrp="1"/>
+          </p:cNvSpPr>
+          <p:nvPr>
+            <p:ph type="title"/>
+          </p:nvPr>
+        </p:nvSpPr>
+        <p:spPr/>
+        <p:txBody>
+          <a:bodyPr/>
+          <a:lstStyle/>
+          <a:p>
+            <a:endParaRPr lang="en-ID"/>
+          </a:p>
+        </p:txBody>
+      </p:sp>
+      <p:pic>
+        <p:nvPicPr>
+          <p:cNvPr id="5" name="Content Placeholder 4">
+            <a:extLst>
+              <a:ext uri="{FF2B5EF4-FFF2-40B4-BE49-F238E27FC236}">
+                <a16:creationId xmlns:a16="http://schemas.microsoft.com/office/drawing/2014/main" id="{5DA8BA16-7C7D-076C-C542-1F3768A3049B}"/>
+              </a:ext>
+            </a:extLst>
+          </p:cNvPr>
+          <p:cNvPicPr>
+            <a:picLocks noGrp="1" noChangeAspect="1"/>
+          </p:cNvPicPr>
+          <p:nvPr>
+            <p:ph idx="1"/>
+          </p:nvPr>
+        </p:nvPicPr>
+        <p:blipFill>
+          <a:blip r:embed="rId2"/>
+          <a:stretch>
+            <a:fillRect/>
+          </a:stretch>
+        </p:blipFill>
+        <p:spPr>
+          <a:xfrm>
+            <a:off x="2414587" y="1996281"/>
+            <a:ext cx="7362825" cy="4010025"/>
+          </a:xfrm>
+        </p:spPr>
+      </p:pic>
+    </p:spTree>
+    <p:extLst>
+      <p:ext uri="{BB962C8B-B14F-4D97-AF65-F5344CB8AC3E}">
+        <p14:creationId xmlns:p14="http://schemas.microsoft.com/office/powerpoint/2010/main" val="1958102561"/>
+      </p:ext>
+    </p:extLst>
+  </p:cSld>
+  <p:clrMapOvr>
+    <a:masterClrMapping/>
+  </p:clrMapOvr>
+</p:sld>
+</file>
+
+<file path=ppt/slides/slide9.xml><?xml version="1.0" encoding="utf-8"?>
+<p:sld xmlns:a="http://schemas.openxmlformats.org/drawingml/2006/main" xmlns:r="http://schemas.openxmlformats.org/officeDocument/2006/relationships" xmlns:p="http://schemas.openxmlformats.org/presentationml/2006/main">
+  <p:cSld>
+    <p:spTree>
+      <p:nvGrpSpPr>
+        <p:cNvPr id="1" name=""/>
+        <p:cNvGrpSpPr/>
+        <p:nvPr/>
+      </p:nvGrpSpPr>
+      <p:grpSpPr>
+        <a:xfrm>
+          <a:off x="0" y="0"/>
+          <a:ext cx="0" cy="0"/>
+          <a:chOff x="0" y="0"/>
+          <a:chExt cx="0" cy="0"/>
+        </a:xfrm>
+      </p:grpSpPr>
+      <p:sp>
+        <p:nvSpPr>
+          <p:cNvPr id="2" name="Title 1">
+            <a:extLst>
+              <a:ext uri="{FF2B5EF4-FFF2-40B4-BE49-F238E27FC236}">
+                <a16:creationId xmlns:a16="http://schemas.microsoft.com/office/drawing/2014/main" id="{2003C136-12E3-EC39-1F52-3B0559A06B29}"/>
+              </a:ext>
+            </a:extLst>
+          </p:cNvPr>
+          <p:cNvSpPr>
+            <a:spLocks noGrp="1"/>
+          </p:cNvSpPr>
+          <p:nvPr>
+            <p:ph type="title"/>
+          </p:nvPr>
+        </p:nvSpPr>
+        <p:spPr/>
+        <p:txBody>
+          <a:bodyPr/>
+          <a:lstStyle/>
+          <a:p>
+            <a:endParaRPr lang="en-ID"/>
+          </a:p>
+        </p:txBody>
+      </p:sp>
+      <p:pic>
+        <p:nvPicPr>
+          <p:cNvPr id="5" name="Content Placeholder 4">
+            <a:extLst>
+              <a:ext uri="{FF2B5EF4-FFF2-40B4-BE49-F238E27FC236}">
+                <a16:creationId xmlns:a16="http://schemas.microsoft.com/office/drawing/2014/main" id="{D586166B-C8EB-CE0A-3138-92850879F60B}"/>
+              </a:ext>
+            </a:extLst>
+          </p:cNvPr>
+          <p:cNvPicPr>
+            <a:picLocks noGrp="1" noChangeAspect="1"/>
+          </p:cNvPicPr>
+          <p:nvPr>
+            <p:ph idx="1"/>
+          </p:nvPr>
+        </p:nvPicPr>
+        <p:blipFill>
+          <a:blip r:embed="rId2"/>
+          <a:stretch>
+            <a:fillRect/>
+          </a:stretch>
+        </p:blipFill>
+        <p:spPr>
+          <a:xfrm>
+            <a:off x="1924050" y="2172494"/>
+            <a:ext cx="8343900" cy="3657600"/>
+          </a:xfrm>
+        </p:spPr>
+      </p:pic>
+    </p:spTree>
+    <p:extLst>
+      <p:ext uri="{BB962C8B-B14F-4D97-AF65-F5344CB8AC3E}">
+        <p14:creationId xmlns:p14="http://schemas.microsoft.com/office/powerpoint/2010/main" val="3795960263"/>
       </p:ext>
     </p:extLst>
   </p:cSld>

</xml_diff>